<commit_message>
Add day 2 schedule to day 1 overview
</commit_message>
<xml_diff>
--- a/slides/TDD Day 1.pptx
+++ b/slides/TDD Day 1.pptx
@@ -7,27 +7,28 @@
   <p:sldIdLst>
     <p:sldId id="256" r:id="rId2"/>
     <p:sldId id="258" r:id="rId3"/>
-    <p:sldId id="260" r:id="rId4"/>
-    <p:sldId id="265" r:id="rId5"/>
-    <p:sldId id="267" r:id="rId6"/>
-    <p:sldId id="268" r:id="rId7"/>
-    <p:sldId id="269" r:id="rId8"/>
-    <p:sldId id="270" r:id="rId9"/>
-    <p:sldId id="261" r:id="rId10"/>
-    <p:sldId id="262" r:id="rId11"/>
-    <p:sldId id="263" r:id="rId12"/>
-    <p:sldId id="264" r:id="rId13"/>
-    <p:sldId id="271" r:id="rId14"/>
-    <p:sldId id="273" r:id="rId15"/>
-    <p:sldId id="274" r:id="rId16"/>
-    <p:sldId id="275" r:id="rId17"/>
-    <p:sldId id="276" r:id="rId18"/>
-    <p:sldId id="277" r:id="rId19"/>
-    <p:sldId id="278" r:id="rId20"/>
-    <p:sldId id="279" r:id="rId21"/>
-    <p:sldId id="280" r:id="rId22"/>
-    <p:sldId id="281" r:id="rId23"/>
-    <p:sldId id="282" r:id="rId24"/>
+    <p:sldId id="283" r:id="rId4"/>
+    <p:sldId id="260" r:id="rId5"/>
+    <p:sldId id="265" r:id="rId6"/>
+    <p:sldId id="267" r:id="rId7"/>
+    <p:sldId id="268" r:id="rId8"/>
+    <p:sldId id="269" r:id="rId9"/>
+    <p:sldId id="270" r:id="rId10"/>
+    <p:sldId id="261" r:id="rId11"/>
+    <p:sldId id="262" r:id="rId12"/>
+    <p:sldId id="263" r:id="rId13"/>
+    <p:sldId id="264" r:id="rId14"/>
+    <p:sldId id="271" r:id="rId15"/>
+    <p:sldId id="273" r:id="rId16"/>
+    <p:sldId id="274" r:id="rId17"/>
+    <p:sldId id="275" r:id="rId18"/>
+    <p:sldId id="276" r:id="rId19"/>
+    <p:sldId id="277" r:id="rId20"/>
+    <p:sldId id="278" r:id="rId21"/>
+    <p:sldId id="279" r:id="rId22"/>
+    <p:sldId id="280" r:id="rId23"/>
+    <p:sldId id="281" r:id="rId24"/>
+    <p:sldId id="282" r:id="rId25"/>
   </p:sldIdLst>
   <p:sldSz cx="9144000" cy="6858000" type="screen4x3"/>
   <p:notesSz cx="6858000" cy="9144000"/>
@@ -310,7 +311,7 @@
           <a:p>
             <a:fld id="{6BFECD78-3C8E-49F2-8FAB-59489D168ABB}" type="datetimeFigureOut">
               <a:rPr lang="en-US" smtClean="0"/>
-              <a:t>9/11/16</a:t>
+              <a:t>9/12/16</a:t>
             </a:fld>
             <a:endParaRPr lang="en-US"/>
           </a:p>
@@ -480,7 +481,7 @@
           <a:p>
             <a:fld id="{6BFECD78-3C8E-49F2-8FAB-59489D168ABB}" type="datetimeFigureOut">
               <a:rPr lang="en-US" smtClean="0"/>
-              <a:t>9/11/16</a:t>
+              <a:t>9/12/16</a:t>
             </a:fld>
             <a:endParaRPr lang="en-US"/>
           </a:p>
@@ -660,7 +661,7 @@
           <a:p>
             <a:fld id="{6BFECD78-3C8E-49F2-8FAB-59489D168ABB}" type="datetimeFigureOut">
               <a:rPr lang="en-US" smtClean="0"/>
-              <a:t>9/11/16</a:t>
+              <a:t>9/12/16</a:t>
             </a:fld>
             <a:endParaRPr lang="en-US"/>
           </a:p>
@@ -830,7 +831,7 @@
           <a:p>
             <a:fld id="{6BFECD78-3C8E-49F2-8FAB-59489D168ABB}" type="datetimeFigureOut">
               <a:rPr lang="en-US" smtClean="0"/>
-              <a:t>9/11/16</a:t>
+              <a:t>9/12/16</a:t>
             </a:fld>
             <a:endParaRPr lang="en-US"/>
           </a:p>
@@ -1076,7 +1077,7 @@
           <a:p>
             <a:fld id="{6BFECD78-3C8E-49F2-8FAB-59489D168ABB}" type="datetimeFigureOut">
               <a:rPr lang="en-US" smtClean="0"/>
-              <a:t>9/11/16</a:t>
+              <a:t>9/12/16</a:t>
             </a:fld>
             <a:endParaRPr lang="en-US"/>
           </a:p>
@@ -1364,7 +1365,7 @@
           <a:p>
             <a:fld id="{6BFECD78-3C8E-49F2-8FAB-59489D168ABB}" type="datetimeFigureOut">
               <a:rPr lang="en-US" smtClean="0"/>
-              <a:t>9/11/16</a:t>
+              <a:t>9/12/16</a:t>
             </a:fld>
             <a:endParaRPr lang="en-US"/>
           </a:p>
@@ -1786,7 +1787,7 @@
           <a:p>
             <a:fld id="{6BFECD78-3C8E-49F2-8FAB-59489D168ABB}" type="datetimeFigureOut">
               <a:rPr lang="en-US" smtClean="0"/>
-              <a:t>9/11/16</a:t>
+              <a:t>9/12/16</a:t>
             </a:fld>
             <a:endParaRPr lang="en-US"/>
           </a:p>
@@ -1904,7 +1905,7 @@
           <a:p>
             <a:fld id="{6BFECD78-3C8E-49F2-8FAB-59489D168ABB}" type="datetimeFigureOut">
               <a:rPr lang="en-US" smtClean="0"/>
-              <a:t>9/11/16</a:t>
+              <a:t>9/12/16</a:t>
             </a:fld>
             <a:endParaRPr lang="en-US"/>
           </a:p>
@@ -1999,7 +2000,7 @@
           <a:p>
             <a:fld id="{6BFECD78-3C8E-49F2-8FAB-59489D168ABB}" type="datetimeFigureOut">
               <a:rPr lang="en-US" smtClean="0"/>
-              <a:t>9/11/16</a:t>
+              <a:t>9/12/16</a:t>
             </a:fld>
             <a:endParaRPr lang="en-US"/>
           </a:p>
@@ -2276,7 +2277,7 @@
           <a:p>
             <a:fld id="{6BFECD78-3C8E-49F2-8FAB-59489D168ABB}" type="datetimeFigureOut">
               <a:rPr lang="en-US" smtClean="0"/>
-              <a:t>9/11/16</a:t>
+              <a:t>9/12/16</a:t>
             </a:fld>
             <a:endParaRPr lang="en-US"/>
           </a:p>
@@ -2533,7 +2534,7 @@
           <a:p>
             <a:fld id="{6BFECD78-3C8E-49F2-8FAB-59489D168ABB}" type="datetimeFigureOut">
               <a:rPr lang="en-US" smtClean="0"/>
-              <a:t>9/11/16</a:t>
+              <a:t>9/12/16</a:t>
             </a:fld>
             <a:endParaRPr lang="en-US"/>
           </a:p>
@@ -2746,7 +2747,7 @@
           <a:p>
             <a:fld id="{6BFECD78-3C8E-49F2-8FAB-59489D168ABB}" type="datetimeFigureOut">
               <a:rPr lang="en-US" smtClean="0"/>
-              <a:t>9/11/16</a:t>
+              <a:t>9/12/16</a:t>
             </a:fld>
             <a:endParaRPr lang="en-US"/>
           </a:p>
@@ -3242,7 +3243,7 @@
           <a:p>
             <a:r>
               <a:rPr lang="en-US" dirty="0" smtClean="0"/>
-              <a:t>Core Concepts: Unit tests</a:t>
+              <a:t>Core Concepts: TDD &amp; BDD</a:t>
             </a:r>
             <a:endParaRPr lang="en-US" dirty="0"/>
           </a:p>
@@ -3276,7 +3277,37 @@
             </a:pPr>
             <a:r>
               <a:rPr lang="en-US" sz="2000" dirty="0" smtClean="0"/>
-              <a:t>Unit tests</a:t>
+              <a:t>TDD</a:t>
+            </a:r>
+          </a:p>
+          <a:p>
+            <a:pPr marL="800100" lvl="1" indent="-342900" algn="l">
+              <a:buFont typeface="Arial"/>
+              <a:buChar char="•"/>
+            </a:pPr>
+            <a:r>
+              <a:rPr lang="en-US" sz="1600" dirty="0" smtClean="0"/>
+              <a:t>Test Driven Development means write a failing test first</a:t>
+            </a:r>
+          </a:p>
+          <a:p>
+            <a:pPr marL="800100" lvl="1" indent="-342900" algn="l">
+              <a:buFont typeface="Arial"/>
+              <a:buChar char="•"/>
+            </a:pPr>
+            <a:r>
+              <a:rPr lang="en-US" sz="1600" dirty="0" smtClean="0"/>
+              <a:t>Then write functionality to make test pass</a:t>
+            </a:r>
+          </a:p>
+          <a:p>
+            <a:pPr marL="800100" lvl="1" indent="-342900" algn="l">
+              <a:buFont typeface="Arial"/>
+              <a:buChar char="•"/>
+            </a:pPr>
+            <a:r>
+              <a:rPr lang="en-US" sz="1600" dirty="0" smtClean="0"/>
+              <a:t>Only what's needed to make test pass and no more</a:t>
             </a:r>
           </a:p>
           <a:p>
@@ -3286,7 +3317,27 @@
             </a:pPr>
             <a:r>
               <a:rPr lang="en-US" sz="2000" dirty="0" smtClean="0"/>
-              <a:t>The smallest possible pieces of functionality</a:t>
+              <a:t>BDD</a:t>
+            </a:r>
+          </a:p>
+          <a:p>
+            <a:pPr marL="800100" lvl="1" indent="-342900" algn="l">
+              <a:buFont typeface="Arial"/>
+              <a:buChar char="•"/>
+            </a:pPr>
+            <a:r>
+              <a:rPr lang="en-US" sz="1600" dirty="0" smtClean="0"/>
+              <a:t>Behavior Driven Development means write test objectives in plain English</a:t>
+            </a:r>
+          </a:p>
+          <a:p>
+            <a:pPr marL="800100" lvl="1" indent="-342900" algn="l">
+              <a:buFont typeface="Arial"/>
+              <a:buChar char="•"/>
+            </a:pPr>
+            <a:r>
+              <a:rPr lang="en-US" sz="1600" dirty="0" smtClean="0"/>
+              <a:t>Simultaneously define and implement the API that the code exposes</a:t>
             </a:r>
           </a:p>
           <a:p>
@@ -3296,26 +3347,73 @@
             </a:pPr>
             <a:r>
               <a:rPr lang="en-US" sz="2000" dirty="0" smtClean="0"/>
-              <a:t>Fast, fast, fast</a:t>
-            </a:r>
-          </a:p>
-          <a:p>
-            <a:pPr marL="342900" indent="-342900" algn="l">
-              <a:buFont typeface="Arial"/>
-              <a:buChar char="•"/>
-            </a:pPr>
-            <a:r>
-              <a:rPr lang="en-US" sz="2000" dirty="0" smtClean="0"/>
-              <a:t>Robust (opposite of fragile)</a:t>
-            </a:r>
-            <a:endParaRPr lang="en-US" sz="1600" dirty="0" smtClean="0"/>
+              <a:t>Benefits</a:t>
+            </a:r>
+          </a:p>
+          <a:p>
+            <a:pPr marL="800100" lvl="1" indent="-342900" algn="l">
+              <a:buFont typeface="Arial"/>
+              <a:buChar char="•"/>
+            </a:pPr>
+            <a:r>
+              <a:rPr lang="en-US" sz="1600" dirty="0" smtClean="0"/>
+              <a:t>TDD enables confident refactoring</a:t>
+            </a:r>
+          </a:p>
+          <a:p>
+            <a:pPr marL="800100" lvl="1" indent="-342900" algn="l">
+              <a:buFont typeface="Arial"/>
+              <a:buChar char="•"/>
+            </a:pPr>
+            <a:r>
+              <a:rPr lang="en-US" sz="1600" dirty="0" smtClean="0"/>
+              <a:t>TDD </a:t>
+            </a:r>
+            <a:r>
+              <a:rPr lang="en-US" sz="1600" dirty="0"/>
+              <a:t>prevents against premature </a:t>
+            </a:r>
+            <a:r>
+              <a:rPr lang="en-US" sz="1600" dirty="0" smtClean="0"/>
+              <a:t>optimization</a:t>
+            </a:r>
+          </a:p>
+          <a:p>
+            <a:pPr marL="800100" lvl="1" indent="-342900" algn="l">
+              <a:buFont typeface="Arial"/>
+              <a:buChar char="•"/>
+            </a:pPr>
+            <a:r>
+              <a:rPr lang="en-US" sz="1600" dirty="0" smtClean="0"/>
+              <a:t>TDD results in better code coverage</a:t>
+            </a:r>
+          </a:p>
+          <a:p>
+            <a:pPr marL="800100" lvl="1" indent="-342900" algn="l">
+              <a:buFont typeface="Arial"/>
+              <a:buChar char="•"/>
+            </a:pPr>
+            <a:r>
+              <a:rPr lang="en-US" sz="1600" dirty="0" smtClean="0"/>
+              <a:t>BDD promotes clear communication with stakeholders</a:t>
+            </a:r>
+          </a:p>
+          <a:p>
+            <a:pPr marL="800100" lvl="1" indent="-342900" algn="l">
+              <a:buFont typeface="Arial"/>
+              <a:buChar char="•"/>
+            </a:pPr>
+            <a:r>
+              <a:rPr lang="en-US" sz="1600" dirty="0" smtClean="0"/>
+              <a:t>BDD serves as living documentation</a:t>
+            </a:r>
           </a:p>
         </p:txBody>
       </p:sp>
     </p:spTree>
     <p:extLst>
       <p:ext uri="{BB962C8B-B14F-4D97-AF65-F5344CB8AC3E}">
-        <p14:creationId xmlns:p14="http://schemas.microsoft.com/office/powerpoint/2010/main" val="1622738569"/>
+        <p14:creationId xmlns:p14="http://schemas.microsoft.com/office/powerpoint/2010/main" val="3354719638"/>
       </p:ext>
     </p:extLst>
   </p:cSld>
@@ -3371,6 +3469,135 @@
           <a:p>
             <a:r>
               <a:rPr lang="en-US" dirty="0" smtClean="0"/>
+              <a:t>Core Concepts: Unit tests</a:t>
+            </a:r>
+            <a:endParaRPr lang="en-US" dirty="0"/>
+          </a:p>
+        </p:txBody>
+      </p:sp>
+      <p:sp>
+        <p:nvSpPr>
+          <p:cNvPr id="3" name="Subtitle 2"/>
+          <p:cNvSpPr>
+            <a:spLocks noGrp="1"/>
+          </p:cNvSpPr>
+          <p:nvPr>
+            <p:ph type="subTitle" idx="1"/>
+          </p:nvPr>
+        </p:nvSpPr>
+        <p:spPr>
+          <a:xfrm>
+            <a:off x="454651" y="1630710"/>
+            <a:ext cx="8371875" cy="4609893"/>
+          </a:xfrm>
+        </p:spPr>
+        <p:txBody>
+          <a:bodyPr>
+            <a:normAutofit/>
+          </a:bodyPr>
+          <a:lstStyle/>
+          <a:p>
+            <a:pPr marL="342900" indent="-342900" algn="l">
+              <a:buFont typeface="Arial"/>
+              <a:buChar char="•"/>
+            </a:pPr>
+            <a:r>
+              <a:rPr lang="en-US" sz="2000" dirty="0" smtClean="0"/>
+              <a:t>Unit tests</a:t>
+            </a:r>
+          </a:p>
+          <a:p>
+            <a:pPr marL="342900" indent="-342900" algn="l">
+              <a:buFont typeface="Arial"/>
+              <a:buChar char="•"/>
+            </a:pPr>
+            <a:r>
+              <a:rPr lang="en-US" sz="2000" dirty="0" smtClean="0"/>
+              <a:t>The smallest possible pieces of functionality</a:t>
+            </a:r>
+          </a:p>
+          <a:p>
+            <a:pPr marL="342900" indent="-342900" algn="l">
+              <a:buFont typeface="Arial"/>
+              <a:buChar char="•"/>
+            </a:pPr>
+            <a:r>
+              <a:rPr lang="en-US" sz="2000" dirty="0" smtClean="0"/>
+              <a:t>Fast, fast, fast</a:t>
+            </a:r>
+          </a:p>
+          <a:p>
+            <a:pPr marL="342900" indent="-342900" algn="l">
+              <a:buFont typeface="Arial"/>
+              <a:buChar char="•"/>
+            </a:pPr>
+            <a:r>
+              <a:rPr lang="en-US" sz="2000" dirty="0" smtClean="0"/>
+              <a:t>Robust (opposite of fragile)</a:t>
+            </a:r>
+            <a:endParaRPr lang="en-US" sz="1600" dirty="0" smtClean="0"/>
+          </a:p>
+        </p:txBody>
+      </p:sp>
+    </p:spTree>
+    <p:extLst>
+      <p:ext uri="{BB962C8B-B14F-4D97-AF65-F5344CB8AC3E}">
+        <p14:creationId xmlns:p14="http://schemas.microsoft.com/office/powerpoint/2010/main" val="1622738569"/>
+      </p:ext>
+    </p:extLst>
+  </p:cSld>
+  <p:clrMapOvr>
+    <a:masterClrMapping/>
+  </p:clrMapOvr>
+  <p:timing>
+    <p:tnLst>
+      <p:par>
+        <p:cTn xmlns:p14="http://schemas.microsoft.com/office/powerpoint/2010/main" id="1" dur="indefinite" restart="never" nodeType="tmRoot"/>
+      </p:par>
+    </p:tnLst>
+  </p:timing>
+</p:sld>
+</file>
+
+<file path=ppt/slides/slide12.xml><?xml version="1.0" encoding="utf-8"?>
+<p:sld xmlns:a="http://schemas.openxmlformats.org/drawingml/2006/main" xmlns:r="http://schemas.openxmlformats.org/officeDocument/2006/relationships" xmlns:p="http://schemas.openxmlformats.org/presentationml/2006/main">
+  <p:cSld>
+    <p:spTree>
+      <p:nvGrpSpPr>
+        <p:cNvPr id="1" name=""/>
+        <p:cNvGrpSpPr/>
+        <p:nvPr/>
+      </p:nvGrpSpPr>
+      <p:grpSpPr>
+        <a:xfrm>
+          <a:off x="0" y="0"/>
+          <a:ext cx="0" cy="0"/>
+          <a:chOff x="0" y="0"/>
+          <a:chExt cx="0" cy="0"/>
+        </a:xfrm>
+      </p:grpSpPr>
+      <p:sp>
+        <p:nvSpPr>
+          <p:cNvPr id="2" name="Title 1"/>
+          <p:cNvSpPr>
+            <a:spLocks noGrp="1"/>
+          </p:cNvSpPr>
+          <p:nvPr>
+            <p:ph type="ctrTitle"/>
+          </p:nvPr>
+        </p:nvSpPr>
+        <p:spPr>
+          <a:xfrm>
+            <a:off x="685800" y="160685"/>
+            <a:ext cx="7772400" cy="1470025"/>
+          </a:xfrm>
+        </p:spPr>
+        <p:txBody>
+          <a:bodyPr/>
+          <a:lstStyle/>
+          <a:p>
+            <a:r>
+              <a:rPr lang="en-US" dirty="0" smtClean="0"/>
               <a:t>Core Concepts: E2E tests</a:t>
             </a:r>
             <a:endParaRPr lang="en-US" dirty="0"/>
@@ -3460,7 +3687,7 @@
 </p:sld>
 </file>
 
-<file path=ppt/slides/slide12.xml><?xml version="1.0" encoding="utf-8"?>
+<file path=ppt/slides/slide13.xml><?xml version="1.0" encoding="utf-8"?>
 <p:sld xmlns:a="http://schemas.openxmlformats.org/drawingml/2006/main" xmlns:r="http://schemas.openxmlformats.org/officeDocument/2006/relationships" xmlns:p="http://schemas.openxmlformats.org/presentationml/2006/main">
   <p:cSld>
     <p:spTree>
@@ -3779,147 +4006,6 @@
 </p:sld>
 </file>
 
-<file path=ppt/slides/slide13.xml><?xml version="1.0" encoding="utf-8"?>
-<p:sld xmlns:a="http://schemas.openxmlformats.org/drawingml/2006/main" xmlns:r="http://schemas.openxmlformats.org/officeDocument/2006/relationships" xmlns:p="http://schemas.openxmlformats.org/presentationml/2006/main">
-  <p:cSld>
-    <p:spTree>
-      <p:nvGrpSpPr>
-        <p:cNvPr id="1" name=""/>
-        <p:cNvGrpSpPr/>
-        <p:nvPr/>
-      </p:nvGrpSpPr>
-      <p:grpSpPr>
-        <a:xfrm>
-          <a:off x="0" y="0"/>
-          <a:ext cx="0" cy="0"/>
-          <a:chOff x="0" y="0"/>
-          <a:chExt cx="0" cy="0"/>
-        </a:xfrm>
-      </p:grpSpPr>
-      <p:sp>
-        <p:nvSpPr>
-          <p:cNvPr id="2" name="Title 1"/>
-          <p:cNvSpPr>
-            <a:spLocks noGrp="1"/>
-          </p:cNvSpPr>
-          <p:nvPr>
-            <p:ph type="ctrTitle"/>
-          </p:nvPr>
-        </p:nvSpPr>
-        <p:spPr>
-          <a:xfrm>
-            <a:off x="685800" y="160685"/>
-            <a:ext cx="7772400" cy="1470025"/>
-          </a:xfrm>
-        </p:spPr>
-        <p:txBody>
-          <a:bodyPr/>
-          <a:lstStyle/>
-          <a:p>
-            <a:r>
-              <a:rPr lang="en-US" dirty="0" smtClean="0"/>
-              <a:t>Tests in practice</a:t>
-            </a:r>
-            <a:endParaRPr lang="en-US" dirty="0"/>
-          </a:p>
-        </p:txBody>
-      </p:sp>
-      <p:sp>
-        <p:nvSpPr>
-          <p:cNvPr id="3" name="Subtitle 2"/>
-          <p:cNvSpPr>
-            <a:spLocks noGrp="1"/>
-          </p:cNvSpPr>
-          <p:nvPr>
-            <p:ph type="subTitle" idx="1"/>
-          </p:nvPr>
-        </p:nvSpPr>
-        <p:spPr>
-          <a:xfrm>
-            <a:off x="454651" y="1630710"/>
-            <a:ext cx="8371875" cy="4609893"/>
-          </a:xfrm>
-        </p:spPr>
-        <p:txBody>
-          <a:bodyPr>
-            <a:normAutofit/>
-          </a:bodyPr>
-          <a:lstStyle/>
-          <a:p>
-            <a:pPr marL="342900" indent="-342900" algn="l">
-              <a:buFont typeface="Arial"/>
-              <a:buChar char="•"/>
-            </a:pPr>
-            <a:r>
-              <a:rPr lang="en-US" sz="2000" dirty="0" smtClean="0"/>
-              <a:t>Tests have to get run in order to be effective</a:t>
-            </a:r>
-          </a:p>
-          <a:p>
-            <a:pPr marL="342900" indent="-342900" algn="l">
-              <a:buFont typeface="Arial"/>
-              <a:buChar char="•"/>
-            </a:pPr>
-            <a:r>
-              <a:rPr lang="en-US" sz="2000" dirty="0" smtClean="0"/>
-              <a:t>Tools have to work well</a:t>
-            </a:r>
-          </a:p>
-          <a:p>
-            <a:pPr marL="342900" indent="-342900" algn="l">
-              <a:buFont typeface="Arial"/>
-              <a:buChar char="•"/>
-            </a:pPr>
-            <a:r>
-              <a:rPr lang="en-US" sz="2000" dirty="0" smtClean="0"/>
-              <a:t>Different tests at different times…</a:t>
-            </a:r>
-          </a:p>
-          <a:p>
-            <a:pPr marL="342900" indent="-342900" algn="l">
-              <a:buFont typeface="Arial"/>
-              <a:buChar char="•"/>
-            </a:pPr>
-            <a:r>
-              <a:rPr lang="en-US" sz="2000" dirty="0" smtClean="0"/>
-              <a:t>Units : development</a:t>
-            </a:r>
-            <a:r>
-              <a:rPr lang="en-US" sz="2000" dirty="0"/>
-              <a:t> process</a:t>
-            </a:r>
-            <a:r>
-              <a:rPr lang="en-US" sz="2000" dirty="0" smtClean="0"/>
-              <a:t> :: E2E : deployment </a:t>
-            </a:r>
-            <a:r>
-              <a:rPr lang="en-US" sz="2000" dirty="0" smtClean="0"/>
-              <a:t>process</a:t>
-            </a:r>
-            <a:endParaRPr lang="en-US" sz="2000" dirty="0" smtClean="0"/>
-          </a:p>
-        </p:txBody>
-      </p:sp>
-    </p:spTree>
-    <p:extLst>
-      <p:ext uri="{BB962C8B-B14F-4D97-AF65-F5344CB8AC3E}">
-        <p14:creationId xmlns:p14="http://schemas.microsoft.com/office/powerpoint/2010/main" val="3910608230"/>
-      </p:ext>
-    </p:extLst>
-  </p:cSld>
-  <p:clrMapOvr>
-    <a:masterClrMapping/>
-  </p:clrMapOvr>
-  <p:timing>
-    <p:tnLst>
-      <p:par>
-        <p:cTn xmlns:p14="http://schemas.microsoft.com/office/powerpoint/2010/main" id="1" dur="indefinite" restart="never" nodeType="tmRoot"/>
-      </p:par>
-    </p:tnLst>
-  </p:timing>
-</p:sld>
-</file>
-
 <file path=ppt/slides/slide14.xml><?xml version="1.0" encoding="utf-8"?>
 <p:sld xmlns:a="http://schemas.openxmlformats.org/drawingml/2006/main" xmlns:r="http://schemas.openxmlformats.org/officeDocument/2006/relationships" xmlns:p="http://schemas.openxmlformats.org/presentationml/2006/main">
   <p:cSld>
@@ -3959,7 +4045,7 @@
           <a:p>
             <a:r>
               <a:rPr lang="en-US" dirty="0" smtClean="0"/>
-              <a:t>Good Tests</a:t>
+              <a:t>Tests in practice</a:t>
             </a:r>
             <a:endParaRPr lang="en-US" dirty="0"/>
           </a:p>
@@ -3987,151 +4073,59 @@
           </a:bodyPr>
           <a:lstStyle/>
           <a:p>
-            <a:pPr algn="l"/>
+            <a:pPr marL="342900" indent="-342900" algn="l">
+              <a:buFont typeface="Arial"/>
+              <a:buChar char="•"/>
+            </a:pPr>
+            <a:r>
+              <a:rPr lang="en-US" sz="2000" dirty="0" smtClean="0"/>
+              <a:t>Tests have to get run in order to be effective</a:t>
+            </a:r>
+          </a:p>
+          <a:p>
+            <a:pPr marL="342900" indent="-342900" algn="l">
+              <a:buFont typeface="Arial"/>
+              <a:buChar char="•"/>
+            </a:pPr>
+            <a:r>
+              <a:rPr lang="en-US" sz="2000" dirty="0" smtClean="0"/>
+              <a:t>Tools have to work well</a:t>
+            </a:r>
+          </a:p>
+          <a:p>
+            <a:pPr marL="342900" indent="-342900" algn="l">
+              <a:buFont typeface="Arial"/>
+              <a:buChar char="•"/>
+            </a:pPr>
+            <a:r>
+              <a:rPr lang="en-US" sz="2000" dirty="0" smtClean="0"/>
+              <a:t>Different tests at different times…</a:t>
+            </a:r>
+          </a:p>
+          <a:p>
+            <a:pPr marL="342900" indent="-342900" algn="l">
+              <a:buFont typeface="Arial"/>
+              <a:buChar char="•"/>
+            </a:pPr>
+            <a:r>
+              <a:rPr lang="en-US" sz="2000" dirty="0" smtClean="0"/>
+              <a:t>Units : development</a:t>
+            </a:r>
             <a:r>
               <a:rPr lang="en-US" sz="2000" dirty="0"/>
-              <a:t>Designing good test cases is a complex art. The complexity comes from </a:t>
+              <a:t> process</a:t>
             </a:r>
             <a:r>
               <a:rPr lang="en-US" sz="2000" dirty="0" smtClean="0"/>
-              <a:t>three sources</a:t>
-            </a:r>
-            <a:r>
-              <a:rPr lang="en-US" sz="2000" dirty="0"/>
-              <a:t>:</a:t>
-            </a:r>
-          </a:p>
-          <a:p>
-            <a:pPr marL="342900" indent="-342900" algn="l">
-              <a:buFont typeface="Arial"/>
-              <a:buChar char="•"/>
-            </a:pPr>
-            <a:r>
-              <a:rPr lang="en-US" sz="2000" dirty="0" smtClean="0"/>
-              <a:t>Test </a:t>
-            </a:r>
-            <a:r>
-              <a:rPr lang="en-US" sz="2000" dirty="0"/>
-              <a:t>cases help us discover information. Different types of tests are more</a:t>
-            </a:r>
-          </a:p>
-          <a:p>
-            <a:pPr algn="l"/>
-            <a:r>
-              <a:rPr lang="en-US" sz="2000" dirty="0"/>
-              <a:t>effective for different classes of information.</a:t>
-            </a:r>
-          </a:p>
-          <a:p>
-            <a:pPr marL="342900" indent="-342900" algn="l">
-              <a:buFont typeface="Arial"/>
-              <a:buChar char="•"/>
-            </a:pPr>
-            <a:r>
-              <a:rPr lang="en-US" sz="2000" dirty="0" smtClean="0"/>
-              <a:t>Test </a:t>
-            </a:r>
-            <a:r>
-              <a:rPr lang="en-US" sz="2000" dirty="0"/>
-              <a:t>cases can be “good” in a variety of ways. No test case will be good </a:t>
-            </a:r>
-            <a:r>
-              <a:rPr lang="en-US" sz="2000" dirty="0" smtClean="0"/>
-              <a:t>in all </a:t>
-            </a:r>
-            <a:r>
-              <a:rPr lang="en-US" sz="2000" dirty="0"/>
-              <a:t>of them.</a:t>
-            </a:r>
-          </a:p>
-          <a:p>
-            <a:pPr marL="342900" indent="-342900" algn="l">
-              <a:buFont typeface="Arial"/>
-              <a:buChar char="•"/>
-            </a:pPr>
-            <a:r>
-              <a:rPr lang="en-US" sz="2000" dirty="0" smtClean="0"/>
-              <a:t>People </a:t>
-            </a:r>
-            <a:r>
-              <a:rPr lang="en-US" sz="2000" dirty="0"/>
-              <a:t>tend to create test cases according to certain testing styles, such </a:t>
-            </a:r>
-            <a:r>
-              <a:rPr lang="en-US" sz="2000" dirty="0" smtClean="0"/>
-              <a:t>as domain </a:t>
-            </a:r>
-            <a:r>
-              <a:rPr lang="en-US" sz="2000" dirty="0"/>
-              <a:t>testing or risk-based testing. Good domain tests are different </a:t>
-            </a:r>
-            <a:r>
-              <a:rPr lang="en-US" sz="2000" dirty="0" smtClean="0"/>
-              <a:t>from good </a:t>
-            </a:r>
-            <a:r>
-              <a:rPr lang="en-US" sz="2000" dirty="0"/>
-              <a:t>risk-based tests. </a:t>
-            </a:r>
-            <a:endParaRPr lang="en-US" sz="2000" dirty="0" smtClean="0"/>
-          </a:p>
-          <a:p>
-            <a:pPr marL="342900" indent="-342900" algn="l">
-              <a:buFont typeface="Arial"/>
-              <a:buChar char="•"/>
-            </a:pPr>
-            <a:endParaRPr lang="en-US" sz="2000" dirty="0"/>
-          </a:p>
-          <a:p>
-            <a:pPr algn="l"/>
-            <a:r>
-              <a:rPr lang="en-US" sz="2000" dirty="0" smtClean="0"/>
-              <a:t>- </a:t>
-            </a:r>
-            <a:r>
-              <a:rPr lang="en-US" sz="2000" dirty="0" err="1" smtClean="0"/>
-              <a:t>Cem</a:t>
-            </a:r>
-            <a:r>
-              <a:rPr lang="en-US" sz="2000" dirty="0" smtClean="0"/>
-              <a:t> </a:t>
-            </a:r>
-            <a:r>
-              <a:rPr lang="en-US" sz="2000" dirty="0" err="1" smtClean="0"/>
-              <a:t>Kaner</a:t>
-            </a:r>
-            <a:r>
-              <a:rPr lang="en-US" sz="2000" dirty="0"/>
-              <a:t>, http://</a:t>
-            </a:r>
-            <a:r>
-              <a:rPr lang="en-US" sz="2000" dirty="0" err="1"/>
-              <a:t>www.kaner.com</a:t>
-            </a:r>
-            <a:r>
-              <a:rPr lang="en-US" sz="2000" dirty="0"/>
-              <a:t>/</a:t>
-            </a:r>
-            <a:r>
-              <a:rPr lang="en-US" sz="2000" dirty="0" err="1"/>
-              <a:t>pdfs</a:t>
-            </a:r>
-            <a:r>
-              <a:rPr lang="en-US" sz="2000" dirty="0"/>
-              <a:t>/</a:t>
-            </a:r>
-            <a:r>
-              <a:rPr lang="en-US" sz="2000" dirty="0" err="1"/>
-              <a:t>GoodTest.pdf</a:t>
-            </a:r>
-            <a:endParaRPr lang="en-US" sz="2000" dirty="0" smtClean="0"/>
+              <a:t> :: E2E : deployment process</a:t>
+            </a:r>
           </a:p>
         </p:txBody>
       </p:sp>
     </p:spTree>
     <p:extLst>
       <p:ext uri="{BB962C8B-B14F-4D97-AF65-F5344CB8AC3E}">
-        <p14:creationId xmlns:p14="http://schemas.microsoft.com/office/powerpoint/2010/main" val="1093713714"/>
+        <p14:creationId xmlns:p14="http://schemas.microsoft.com/office/powerpoint/2010/main" val="3910608230"/>
       </p:ext>
     </p:extLst>
   </p:cSld>
@@ -4217,102 +4211,149 @@
           <a:p>
             <a:pPr algn="l"/>
             <a:r>
-              <a:rPr lang="en-US" sz="2200" dirty="0" smtClean="0"/>
-              <a:t>What’s </a:t>
-            </a:r>
-            <a:r>
-              <a:rPr lang="en-US" sz="2200" dirty="0"/>
-              <a:t>a test case?</a:t>
+              <a:rPr lang="en-US" sz="2000" dirty="0"/>
+              <a:t>Designing good test cases is a complex art. The complexity comes from </a:t>
+            </a:r>
+            <a:r>
+              <a:rPr lang="en-US" sz="2000" dirty="0" smtClean="0"/>
+              <a:t>three sources</a:t>
+            </a:r>
+            <a:r>
+              <a:rPr lang="en-US" sz="2000" dirty="0"/>
+              <a:t>:</a:t>
+            </a:r>
+          </a:p>
+          <a:p>
+            <a:pPr marL="342900" indent="-342900" algn="l">
+              <a:buFont typeface="Arial"/>
+              <a:buChar char="•"/>
+            </a:pPr>
+            <a:r>
+              <a:rPr lang="en-US" sz="2000" dirty="0" smtClean="0"/>
+              <a:t>Test </a:t>
+            </a:r>
+            <a:r>
+              <a:rPr lang="en-US" sz="2000" dirty="0"/>
+              <a:t>cases help us discover information. Different types of tests are more</a:t>
             </a:r>
           </a:p>
           <a:p>
             <a:pPr algn="l"/>
+            <a:r>
+              <a:rPr lang="en-US" sz="2000" dirty="0"/>
+              <a:t>effective for different classes of information.</a:t>
+            </a:r>
+          </a:p>
+          <a:p>
+            <a:pPr marL="342900" indent="-342900" algn="l">
+              <a:buFont typeface="Arial"/>
+              <a:buChar char="•"/>
+            </a:pPr>
+            <a:r>
+              <a:rPr lang="en-US" sz="2000" dirty="0" smtClean="0"/>
+              <a:t>Test </a:t>
+            </a:r>
+            <a:r>
+              <a:rPr lang="en-US" sz="2000" dirty="0"/>
+              <a:t>cases can be “good” in a variety of ways. No test case will be good </a:t>
+            </a:r>
+            <a:r>
+              <a:rPr lang="en-US" sz="2000" dirty="0" smtClean="0"/>
+              <a:t>in all </a:t>
+            </a:r>
+            <a:r>
+              <a:rPr lang="en-US" sz="2000" dirty="0"/>
+              <a:t>of them.</a:t>
+            </a:r>
+          </a:p>
+          <a:p>
+            <a:pPr marL="342900" indent="-342900" algn="l">
+              <a:buFont typeface="Arial"/>
+              <a:buChar char="•"/>
+            </a:pPr>
+            <a:r>
+              <a:rPr lang="en-US" sz="2000" dirty="0" smtClean="0"/>
+              <a:t>People </a:t>
+            </a:r>
+            <a:r>
+              <a:rPr lang="en-US" sz="2000" dirty="0"/>
+              <a:t>tend to create test cases according to certain testing styles, such </a:t>
+            </a:r>
+            <a:r>
+              <a:rPr lang="en-US" sz="2000" dirty="0" smtClean="0"/>
+              <a:t>as domain </a:t>
+            </a:r>
+            <a:r>
+              <a:rPr lang="en-US" sz="2000" dirty="0"/>
+              <a:t>testing or risk-based testing. Good domain tests are different </a:t>
+            </a:r>
+            <a:r>
+              <a:rPr lang="en-US" sz="2000" dirty="0" smtClean="0"/>
+              <a:t>from good </a:t>
+            </a:r>
+            <a:r>
+              <a:rPr lang="en-US" sz="2000" dirty="0"/>
+              <a:t>risk-based tests. </a:t>
+            </a:r>
             <a:endParaRPr lang="en-US" sz="2000" dirty="0" smtClean="0"/>
           </a:p>
           <a:p>
+            <a:pPr marL="342900" indent="-342900" algn="l">
+              <a:buFont typeface="Arial"/>
+              <a:buChar char="•"/>
+            </a:pPr>
+            <a:endParaRPr lang="en-US" sz="2000" dirty="0"/>
+          </a:p>
+          <a:p>
             <a:pPr algn="l"/>
             <a:r>
               <a:rPr lang="en-US" sz="2000" dirty="0" smtClean="0"/>
-              <a:t>IEEE </a:t>
+              <a:t>- </a:t>
+            </a:r>
+            <a:r>
+              <a:rPr lang="en-US" sz="2000" dirty="0" err="1" smtClean="0"/>
+              <a:t>Cem</a:t>
+            </a:r>
+            <a:r>
+              <a:rPr lang="en-US" sz="2000" dirty="0" smtClean="0"/>
+              <a:t> </a:t>
+            </a:r>
+            <a:r>
+              <a:rPr lang="en-US" sz="2000" dirty="0" err="1" smtClean="0"/>
+              <a:t>Kaner</a:t>
             </a:r>
             <a:r>
               <a:rPr lang="en-US" sz="2000" dirty="0"/>
-              <a:t>Standard 610 (1990</a:t>
-            </a:r>
-            <a:r>
-              <a:rPr lang="en-US" sz="2000" dirty="0" smtClean="0"/>
-              <a:t>)</a:t>
-            </a:r>
-            <a:endParaRPr lang="en-US" sz="2000" dirty="0"/>
-          </a:p>
-          <a:p>
-            <a:pPr algn="l"/>
-            <a:r>
-              <a:rPr lang="en-US" sz="2000" dirty="0" smtClean="0"/>
-              <a:t>“A </a:t>
+              <a:t>, http://</a:t>
+            </a:r>
+            <a:r>
+              <a:rPr lang="en-US" sz="2000" dirty="0" err="1"/>
+              <a:t>www.kaner.com</a:t>
             </a:r>
             <a:r>
               <a:rPr lang="en-US" sz="2000" dirty="0"/>
-              <a:t>set of test inputs, execution conditions, and expected results developed for </a:t>
-            </a:r>
-            <a:r>
-              <a:rPr lang="en-US" sz="2000" dirty="0" smtClean="0"/>
-              <a:t>a particular </a:t>
+              <a:t>/</a:t>
+            </a:r>
+            <a:r>
+              <a:rPr lang="en-US" sz="2000" dirty="0" err="1"/>
+              <a:t>pdfs</a:t>
             </a:r>
             <a:r>
               <a:rPr lang="en-US" sz="2000" dirty="0"/>
-              <a:t>objective, such as to exercise a particular program path or to verify </a:t>
-            </a:r>
-            <a:r>
-              <a:rPr lang="en-US" sz="2000" dirty="0" smtClean="0"/>
-              <a:t>compliance with </a:t>
-            </a:r>
-            <a:r>
-              <a:rPr lang="en-US" sz="2000" dirty="0"/>
-              <a:t>a specific requirement.</a:t>
-            </a:r>
-          </a:p>
-          <a:p>
-            <a:pPr algn="l"/>
+              <a:t>/</a:t>
+            </a:r>
+            <a:r>
+              <a:rPr lang="en-US" sz="2000" dirty="0" err="1"/>
+              <a:t>GoodTest.pdf</a:t>
+            </a:r>
             <a:endParaRPr lang="en-US" sz="2000" dirty="0" smtClean="0"/>
-          </a:p>
-          <a:p>
-            <a:pPr algn="l"/>
-            <a:r>
-              <a:rPr lang="en-US" sz="2000" dirty="0" smtClean="0"/>
-              <a:t>Ron </a:t>
-            </a:r>
-            <a:r>
-              <a:rPr lang="en-US" sz="2000" dirty="0"/>
-              <a:t>Patton (2001, p. 65),</a:t>
-            </a:r>
-          </a:p>
-          <a:p>
-            <a:pPr algn="l"/>
-            <a:r>
-              <a:rPr lang="en-US" sz="2000" dirty="0"/>
-              <a:t>“Test cases are the specific inputs that you’ll try and the procedures that you’ll </a:t>
-            </a:r>
-            <a:r>
-              <a:rPr lang="en-US" sz="2000" dirty="0" smtClean="0"/>
-              <a:t>follow when </a:t>
-            </a:r>
-            <a:r>
-              <a:rPr lang="en-US" sz="2000" dirty="0"/>
-              <a:t>you test the software.</a:t>
-            </a:r>
-            <a:r>
-              <a:rPr lang="en-US" sz="2000" dirty="0" smtClean="0"/>
-              <a:t>”</a:t>
-            </a:r>
-            <a:endParaRPr lang="en-US" sz="2000" dirty="0"/>
           </a:p>
         </p:txBody>
       </p:sp>
     </p:spTree>
     <p:extLst>
       <p:ext uri="{BB962C8B-B14F-4D97-AF65-F5344CB8AC3E}">
-        <p14:creationId xmlns:p14="http://schemas.microsoft.com/office/powerpoint/2010/main" val="3159094944"/>
+        <p14:creationId xmlns:p14="http://schemas.microsoft.com/office/powerpoint/2010/main" val="1093713714"/>
       </p:ext>
     </p:extLst>
   </p:cSld>
@@ -4399,94 +4440,93 @@
             <a:pPr algn="l"/>
             <a:r>
               <a:rPr lang="en-US" sz="2200" dirty="0" smtClean="0"/>
-              <a:t>Characteristics</a:t>
-            </a:r>
-          </a:p>
-          <a:p>
-            <a:pPr marL="342900" indent="-342900" algn="l">
-              <a:buFont typeface="Arial"/>
-              <a:buChar char="•"/>
-            </a:pPr>
-            <a:r>
-              <a:rPr lang="en-US" sz="2200" dirty="0" smtClean="0"/>
-              <a:t>Powerful – capable of finding defects</a:t>
-            </a:r>
-          </a:p>
-          <a:p>
-            <a:pPr marL="342900" indent="-342900" algn="l">
-              <a:buFont typeface="Arial"/>
-              <a:buChar char="•"/>
-            </a:pPr>
-            <a:r>
-              <a:rPr lang="en-US" sz="2200" dirty="0" smtClean="0"/>
-              <a:t>Significant – meaningful information</a:t>
-            </a:r>
-          </a:p>
-          <a:p>
-            <a:pPr marL="342900" indent="-342900" algn="l">
-              <a:buFont typeface="Arial"/>
-              <a:buChar char="•"/>
-            </a:pPr>
-            <a:r>
-              <a:rPr lang="en-US" sz="2200" dirty="0" smtClean="0"/>
-              <a:t>Credible – realistic, not edge cases</a:t>
-            </a:r>
-          </a:p>
-          <a:p>
-            <a:pPr marL="342900" indent="-342900" algn="l">
-              <a:buFont typeface="Arial"/>
-              <a:buChar char="•"/>
-            </a:pPr>
-            <a:r>
-              <a:rPr lang="en-US" sz="2200" dirty="0" smtClean="0"/>
-              <a:t>Representative – based on population</a:t>
-            </a:r>
-          </a:p>
-          <a:p>
-            <a:pPr marL="342900" indent="-342900" algn="l">
-              <a:buFont typeface="Arial"/>
-              <a:buChar char="•"/>
-            </a:pPr>
-            <a:r>
-              <a:rPr lang="en-US" sz="2200" dirty="0" smtClean="0"/>
-              <a:t>Ease of evaluation – did the test pass or fail?</a:t>
-            </a:r>
-          </a:p>
-          <a:p>
-            <a:pPr marL="342900" indent="-342900" algn="l">
-              <a:buFont typeface="Arial"/>
-              <a:buChar char="•"/>
-            </a:pPr>
-            <a:r>
-              <a:rPr lang="en-US" sz="2200" dirty="0" smtClean="0"/>
-              <a:t>Use in troubleshooting</a:t>
-            </a:r>
-          </a:p>
-          <a:p>
-            <a:pPr marL="342900" indent="-342900" algn="l">
-              <a:buFont typeface="Arial"/>
-              <a:buChar char="•"/>
-            </a:pPr>
-            <a:r>
-              <a:rPr lang="en-US" sz="2200" dirty="0" smtClean="0"/>
-              <a:t>Informative</a:t>
-            </a:r>
-          </a:p>
-          <a:p>
-            <a:pPr marL="342900" indent="-342900" algn="l">
-              <a:buFont typeface="Arial"/>
-              <a:buChar char="•"/>
-            </a:pPr>
-            <a:r>
-              <a:rPr lang="en-US" sz="2200" dirty="0" smtClean="0"/>
-              <a:t>Appropriately complex</a:t>
-            </a:r>
-          </a:p>
-          <a:p>
-            <a:pPr marL="342900" indent="-342900" algn="l">
-              <a:buFont typeface="Arial"/>
-              <a:buChar char="•"/>
-            </a:pPr>
+              <a:t>What’s </a:t>
+            </a:r>
+            <a:r>
+              <a:rPr lang="en-US" sz="2200" dirty="0"/>
+              <a:t>a test case?</a:t>
+            </a:r>
+          </a:p>
+          <a:p>
+            <a:pPr algn="l"/>
+            <a:endParaRPr lang="en-US" sz="2000" dirty="0" smtClean="0"/>
+          </a:p>
+          <a:p>
+            <a:pPr algn="l"/>
+            <a:r>
+              <a:rPr lang="en-US" sz="2000" dirty="0" smtClean="0"/>
+              <a:t>IEEE </a:t>
+            </a:r>
+            <a:r>
+              <a:rPr lang="en-US" sz="2000" dirty="0"/>
+              <a:t>Standard 610 (1990</a:t>
+            </a:r>
+            <a:r>
+              <a:rPr lang="en-US" sz="2000" dirty="0" smtClean="0"/>
+              <a:t>)</a:t>
+            </a:r>
+            <a:endParaRPr lang="en-US" sz="2000" dirty="0"/>
+          </a:p>
+          <a:p>
+            <a:pPr algn="l"/>
+            <a:r>
+              <a:rPr lang="en-US" sz="2000" dirty="0" smtClean="0"/>
+              <a:t>“A </a:t>
+            </a:r>
+            <a:r>
+              <a:rPr lang="en-US" sz="2000" dirty="0"/>
+              <a:t>set of test inputs, execution conditions, and expected results developed for </a:t>
+            </a:r>
+            <a:r>
+              <a:rPr lang="en-US" sz="2000" dirty="0" smtClean="0"/>
+              <a:t>a particular </a:t>
+            </a:r>
+            <a:r>
+              <a:rPr lang="en-US" sz="2000" dirty="0"/>
+              <a:t>objective, such as to exercise a particular program path or to verify </a:t>
+            </a:r>
+            <a:r>
+              <a:rPr lang="en-US" sz="2000" dirty="0" smtClean="0"/>
+              <a:t>compliance with </a:t>
+            </a:r>
+            <a:r>
+              <a:rPr lang="en-US" sz="2000" dirty="0"/>
+              <a:t>a specific requirement.</a:t>
+            </a:r>
+          </a:p>
+          <a:p>
+            <a:pPr algn="l"/>
+            <a:endParaRPr lang="en-US" sz="2000" dirty="0" smtClean="0"/>
+          </a:p>
+          <a:p>
+            <a:pPr algn="l"/>
+            <a:r>
+              <a:rPr lang="en-US" sz="2000" dirty="0" smtClean="0"/>
+              <a:t>Ron </a:t>
+            </a:r>
+            <a:r>
+              <a:rPr lang="en-US" sz="2000" dirty="0"/>
+              <a:t>Patton (2001, p. 65),</a:t>
+            </a:r>
+          </a:p>
+          <a:p>
+            <a:pPr algn="l"/>
+            <a:r>
+              <a:rPr lang="en-US" sz="2000" dirty="0"/>
+              <a:t>“Test cases are the specific inputs that you’ll try and the procedures that you’ll </a:t>
+            </a:r>
+            <a:r>
+              <a:rPr lang="en-US" sz="2000" dirty="0" smtClean="0"/>
+              <a:t>follow when </a:t>
+            </a:r>
+            <a:r>
+              <a:rPr lang="en-US" sz="2000" dirty="0"/>
+              <a:t>you test the software.</a:t>
+            </a:r>
+            <a:r>
+              <a:rPr lang="en-US" sz="2000" dirty="0" smtClean="0"/>
+              <a:t>”</a:t>
+            </a:r>
             <a:endParaRPr lang="en-US" sz="2000" dirty="0"/>
           </a:p>
         </p:txBody>
@@ -4494,7 +4534,7 @@
     </p:spTree>
     <p:extLst>
       <p:ext uri="{BB962C8B-B14F-4D97-AF65-F5344CB8AC3E}">
-        <p14:creationId xmlns:p14="http://schemas.microsoft.com/office/powerpoint/2010/main" val="1613611806"/>
+        <p14:creationId xmlns:p14="http://schemas.microsoft.com/office/powerpoint/2010/main" val="3159094944"/>
       </p:ext>
     </p:extLst>
   </p:cSld>
@@ -4581,7 +4621,7 @@
             <a:pPr algn="l"/>
             <a:r>
               <a:rPr lang="en-US" sz="2200" dirty="0" smtClean="0"/>
-              <a:t>Types     </a:t>
+              <a:t>Characteristics</a:t>
             </a:r>
           </a:p>
           <a:p>
@@ -4591,102 +4631,84 @@
             </a:pPr>
             <a:r>
               <a:rPr lang="en-US" sz="2200" dirty="0" smtClean="0"/>
-              <a:t>Function </a:t>
-            </a:r>
-            <a:r>
-              <a:rPr lang="en-US" sz="2200" dirty="0"/>
-              <a:t>testing</a:t>
-            </a:r>
-          </a:p>
-          <a:p>
-            <a:pPr marL="342900" indent="-342900" algn="l">
-              <a:buFont typeface="Arial"/>
-              <a:buChar char="•"/>
-            </a:pPr>
-            <a:r>
-              <a:rPr lang="en-US" sz="2200" dirty="0"/>
-              <a:t> Domain testing</a:t>
-            </a:r>
-          </a:p>
-          <a:p>
-            <a:pPr marL="342900" indent="-342900" algn="l">
-              <a:buFont typeface="Arial"/>
-              <a:buChar char="•"/>
-            </a:pPr>
-            <a:r>
-              <a:rPr lang="en-US" sz="2200" dirty="0"/>
-              <a:t> Specification-based testing</a:t>
-            </a:r>
-          </a:p>
-          <a:p>
-            <a:pPr marL="342900" indent="-342900" algn="l">
-              <a:buFont typeface="Arial"/>
-              <a:buChar char="•"/>
-            </a:pPr>
-            <a:r>
-              <a:rPr lang="en-US" sz="2200" dirty="0"/>
-              <a:t> Risk-based testing</a:t>
-            </a:r>
-          </a:p>
-          <a:p>
-            <a:pPr marL="342900" indent="-342900" algn="l">
-              <a:buFont typeface="Arial"/>
-              <a:buChar char="•"/>
-            </a:pPr>
-            <a:r>
-              <a:rPr lang="en-US" sz="2200" dirty="0"/>
-              <a:t> Stress testing</a:t>
-            </a:r>
-          </a:p>
-          <a:p>
-            <a:pPr marL="342900" indent="-342900" algn="l">
-              <a:buFont typeface="Arial"/>
-              <a:buChar char="•"/>
-            </a:pPr>
-            <a:r>
-              <a:rPr lang="en-US" sz="2200" dirty="0"/>
-              <a:t> Regression testing</a:t>
-            </a:r>
-          </a:p>
-          <a:p>
-            <a:pPr marL="342900" indent="-342900" algn="l">
-              <a:buFont typeface="Arial"/>
-              <a:buChar char="•"/>
-            </a:pPr>
-            <a:r>
-              <a:rPr lang="en-US" sz="2200" dirty="0"/>
-              <a:t> User testing</a:t>
-            </a:r>
-          </a:p>
-          <a:p>
-            <a:pPr marL="342900" indent="-342900" algn="l">
-              <a:buFont typeface="Arial"/>
-              <a:buChar char="•"/>
-            </a:pPr>
-            <a:r>
-              <a:rPr lang="en-US" sz="2200" dirty="0"/>
-              <a:t> Scenario testing</a:t>
-            </a:r>
-          </a:p>
-          <a:p>
-            <a:pPr marL="342900" indent="-342900" algn="l">
-              <a:buFont typeface="Arial"/>
-              <a:buChar char="•"/>
-            </a:pPr>
-            <a:r>
-              <a:rPr lang="en-US" sz="2200" dirty="0"/>
-              <a:t> State-model based testing</a:t>
-            </a:r>
-          </a:p>
-          <a:p>
-            <a:pPr marL="342900" indent="-342900" algn="l">
-              <a:buFont typeface="Arial"/>
-              <a:buChar char="•"/>
-            </a:pPr>
-            <a:r>
-              <a:rPr lang="en-US" sz="2200" dirty="0"/>
-              <a:t> High volume automated testing </a:t>
-            </a:r>
+              <a:t>Powerful – capable of finding defects</a:t>
+            </a:r>
+          </a:p>
+          <a:p>
+            <a:pPr marL="342900" indent="-342900" algn="l">
+              <a:buFont typeface="Arial"/>
+              <a:buChar char="•"/>
+            </a:pPr>
+            <a:r>
+              <a:rPr lang="en-US" sz="2200" dirty="0" smtClean="0"/>
+              <a:t>Significant – meaningful information</a:t>
+            </a:r>
+          </a:p>
+          <a:p>
+            <a:pPr marL="342900" indent="-342900" algn="l">
+              <a:buFont typeface="Arial"/>
+              <a:buChar char="•"/>
+            </a:pPr>
+            <a:r>
+              <a:rPr lang="en-US" sz="2200" dirty="0" smtClean="0"/>
+              <a:t>Credible – realistic, not edge cases</a:t>
+            </a:r>
+          </a:p>
+          <a:p>
+            <a:pPr marL="342900" indent="-342900" algn="l">
+              <a:buFont typeface="Arial"/>
+              <a:buChar char="•"/>
+            </a:pPr>
+            <a:r>
+              <a:rPr lang="en-US" sz="2200" dirty="0" smtClean="0"/>
+              <a:t>Representative – based on population</a:t>
+            </a:r>
+          </a:p>
+          <a:p>
+            <a:pPr marL="342900" indent="-342900" algn="l">
+              <a:buFont typeface="Arial"/>
+              <a:buChar char="•"/>
+            </a:pPr>
+            <a:r>
+              <a:rPr lang="en-US" sz="2200" dirty="0" smtClean="0"/>
+              <a:t>Ease of evaluation – did the test pass or fail?</a:t>
+            </a:r>
+          </a:p>
+          <a:p>
+            <a:pPr marL="342900" indent="-342900" algn="l">
+              <a:buFont typeface="Arial"/>
+              <a:buChar char="•"/>
+            </a:pPr>
+            <a:r>
+              <a:rPr lang="en-US" sz="2200" dirty="0" smtClean="0"/>
+              <a:t>Use in troubleshooting</a:t>
+            </a:r>
+          </a:p>
+          <a:p>
+            <a:pPr marL="342900" indent="-342900" algn="l">
+              <a:buFont typeface="Arial"/>
+              <a:buChar char="•"/>
+            </a:pPr>
+            <a:r>
+              <a:rPr lang="en-US" sz="2200" dirty="0" smtClean="0"/>
+              <a:t>Informative</a:t>
+            </a:r>
+          </a:p>
+          <a:p>
+            <a:pPr marL="342900" indent="-342900" algn="l">
+              <a:buFont typeface="Arial"/>
+              <a:buChar char="•"/>
+            </a:pPr>
+            <a:r>
+              <a:rPr lang="en-US" sz="2200" dirty="0" smtClean="0"/>
+              <a:t>Appropriately complex</a:t>
+            </a:r>
+          </a:p>
+          <a:p>
+            <a:pPr marL="342900" indent="-342900" algn="l">
+              <a:buFont typeface="Arial"/>
+              <a:buChar char="•"/>
+            </a:pPr>
             <a:endParaRPr lang="en-US" sz="2000" dirty="0"/>
           </a:p>
         </p:txBody>
@@ -4694,7 +4716,7 @@
     </p:spTree>
     <p:extLst>
       <p:ext uri="{BB962C8B-B14F-4D97-AF65-F5344CB8AC3E}">
-        <p14:creationId xmlns:p14="http://schemas.microsoft.com/office/powerpoint/2010/main" val="2978942451"/>
+        <p14:creationId xmlns:p14="http://schemas.microsoft.com/office/powerpoint/2010/main" val="1613611806"/>
       </p:ext>
     </p:extLst>
   </p:cSld>
@@ -4781,7 +4803,7 @@
             <a:pPr algn="l"/>
             <a:r>
               <a:rPr lang="en-US" sz="2200" dirty="0" smtClean="0"/>
-              <a:t>Measurement</a:t>
+              <a:t>Types     </a:t>
             </a:r>
           </a:p>
           <a:p>
@@ -4791,80 +4813,110 @@
             </a:pPr>
             <a:r>
               <a:rPr lang="en-US" sz="2200" dirty="0" smtClean="0"/>
-              <a:t>Defect rate – bugs per LOC or </a:t>
-            </a:r>
-            <a:r>
-              <a:rPr lang="en-US" sz="2200" dirty="0" err="1" smtClean="0"/>
-              <a:t>dev</a:t>
-            </a:r>
-            <a:r>
-              <a:rPr lang="en-US" sz="2200" dirty="0" smtClean="0"/>
-              <a:t> hour</a:t>
-            </a:r>
-          </a:p>
-          <a:p>
-            <a:pPr marL="342900" indent="-342900" algn="l">
-              <a:buFont typeface="Arial"/>
-              <a:buChar char="•"/>
-            </a:pPr>
-            <a:r>
-              <a:rPr lang="en-US" sz="2200" dirty="0" smtClean="0"/>
-              <a:t>Code coverage</a:t>
-            </a:r>
-          </a:p>
-          <a:p>
-            <a:pPr marL="342900" indent="-342900" algn="l">
-              <a:buFont typeface="Arial"/>
-              <a:buChar char="•"/>
-            </a:pPr>
-            <a:r>
-              <a:rPr lang="en-US" sz="2200" dirty="0" smtClean="0"/>
-              <a:t>Heat map – correlate VCS changes with bug reports</a:t>
-            </a:r>
-          </a:p>
-          <a:p>
-            <a:pPr marL="342900" indent="-342900" algn="l">
-              <a:buFont typeface="Arial"/>
-              <a:buChar char="•"/>
-            </a:pPr>
+              <a:t>Function </a:t>
+            </a:r>
             <a:r>
               <a:rPr lang="en-US" sz="2200" dirty="0"/>
-              <a:t>attribute-component-capability matrix</a:t>
-            </a:r>
-            <a:endParaRPr lang="en-US" sz="2200" dirty="0" smtClean="0"/>
-          </a:p>
-          <a:p>
-            <a:pPr marL="342900" indent="-342900" algn="l">
-              <a:buFont typeface="Arial"/>
-              <a:buChar char="•"/>
-            </a:pPr>
-            <a:r>
-              <a:rPr lang="en-US" sz="2000" dirty="0"/>
-              <a:t>http://</a:t>
-            </a:r>
-            <a:r>
-              <a:rPr lang="en-US" sz="2000" dirty="0" err="1"/>
-              <a:t>www.kaner.com</a:t>
-            </a:r>
-            <a:r>
-              <a:rPr lang="en-US" sz="2000" dirty="0"/>
-              <a:t>/</a:t>
-            </a:r>
-            <a:r>
-              <a:rPr lang="en-US" sz="2000" dirty="0" err="1"/>
-              <a:t>pdfs</a:t>
-            </a:r>
-            <a:r>
-              <a:rPr lang="en-US" sz="2000" dirty="0"/>
-              <a:t>/metrics2004.pdf</a:t>
-            </a:r>
+              <a:t>testing</a:t>
+            </a:r>
+          </a:p>
+          <a:p>
+            <a:pPr marL="342900" indent="-342900" algn="l">
+              <a:buFont typeface="Arial"/>
+              <a:buChar char="•"/>
+            </a:pPr>
+            <a:r>
+              <a:rPr lang="en-US" sz="2200" dirty="0"/>
+              <a:t> Domain testing</a:t>
+            </a:r>
+          </a:p>
+          <a:p>
+            <a:pPr marL="342900" indent="-342900" algn="l">
+              <a:buFont typeface="Arial"/>
+              <a:buChar char="•"/>
+            </a:pPr>
+            <a:r>
+              <a:rPr lang="en-US" sz="2200" dirty="0"/>
+              <a:t> Specification-based testing</a:t>
+            </a:r>
+          </a:p>
+          <a:p>
+            <a:pPr marL="342900" indent="-342900" algn="l">
+              <a:buFont typeface="Arial"/>
+              <a:buChar char="•"/>
+            </a:pPr>
+            <a:r>
+              <a:rPr lang="en-US" sz="2200" dirty="0"/>
+              <a:t> Risk-based testing</a:t>
+            </a:r>
+          </a:p>
+          <a:p>
+            <a:pPr marL="342900" indent="-342900" algn="l">
+              <a:buFont typeface="Arial"/>
+              <a:buChar char="•"/>
+            </a:pPr>
+            <a:r>
+              <a:rPr lang="en-US" sz="2200" dirty="0"/>
+              <a:t> Stress testing</a:t>
+            </a:r>
+          </a:p>
+          <a:p>
+            <a:pPr marL="342900" indent="-342900" algn="l">
+              <a:buFont typeface="Arial"/>
+              <a:buChar char="•"/>
+            </a:pPr>
+            <a:r>
+              <a:rPr lang="en-US" sz="2200" dirty="0"/>
+              <a:t> Regression testing</a:t>
+            </a:r>
+          </a:p>
+          <a:p>
+            <a:pPr marL="342900" indent="-342900" algn="l">
+              <a:buFont typeface="Arial"/>
+              <a:buChar char="•"/>
+            </a:pPr>
+            <a:r>
+              <a:rPr lang="en-US" sz="2200" dirty="0"/>
+              <a:t> User testing</a:t>
+            </a:r>
+          </a:p>
+          <a:p>
+            <a:pPr marL="342900" indent="-342900" algn="l">
+              <a:buFont typeface="Arial"/>
+              <a:buChar char="•"/>
+            </a:pPr>
+            <a:r>
+              <a:rPr lang="en-US" sz="2200" dirty="0"/>
+              <a:t> Scenario testing</a:t>
+            </a:r>
+          </a:p>
+          <a:p>
+            <a:pPr marL="342900" indent="-342900" algn="l">
+              <a:buFont typeface="Arial"/>
+              <a:buChar char="•"/>
+            </a:pPr>
+            <a:r>
+              <a:rPr lang="en-US" sz="2200" dirty="0"/>
+              <a:t> State-model based testing</a:t>
+            </a:r>
+          </a:p>
+          <a:p>
+            <a:pPr marL="342900" indent="-342900" algn="l">
+              <a:buFont typeface="Arial"/>
+              <a:buChar char="•"/>
+            </a:pPr>
+            <a:r>
+              <a:rPr lang="en-US" sz="2200" dirty="0"/>
+              <a:t> High volume automated testing </a:t>
+            </a:r>
+            <a:endParaRPr lang="en-US" sz="2000" dirty="0"/>
           </a:p>
         </p:txBody>
       </p:sp>
     </p:spTree>
     <p:extLst>
       <p:ext uri="{BB962C8B-B14F-4D97-AF65-F5344CB8AC3E}">
-        <p14:creationId xmlns:p14="http://schemas.microsoft.com/office/powerpoint/2010/main" val="1081058882"/>
+        <p14:creationId xmlns:p14="http://schemas.microsoft.com/office/powerpoint/2010/main" val="2978942451"/>
       </p:ext>
     </p:extLst>
   </p:cSld>
@@ -4920,7 +4972,7 @@
           <a:p>
             <a:r>
               <a:rPr lang="en-US" dirty="0" smtClean="0"/>
-              <a:t>Lab: Get started</a:t>
+              <a:t>Good Tests</a:t>
             </a:r>
             <a:endParaRPr lang="en-US" dirty="0"/>
           </a:p>
@@ -4944,147 +4996,97 @@
         </p:spPr>
         <p:txBody>
           <a:bodyPr>
-            <a:normAutofit fontScale="92500" lnSpcReduction="20000"/>
+            <a:normAutofit/>
           </a:bodyPr>
           <a:lstStyle/>
           <a:p>
             <a:pPr algn="l"/>
             <a:r>
-              <a:rPr lang="en-US" sz="2400" dirty="0"/>
-              <a:t>(Code-along, 30 </a:t>
-            </a:r>
-            <a:r>
-              <a:rPr lang="en-US" sz="2400" dirty="0" err="1"/>
-              <a:t>mins</a:t>
-            </a:r>
-            <a:r>
-              <a:rPr lang="en-US" sz="2400" dirty="0" smtClean="0"/>
-              <a:t>)</a:t>
-            </a:r>
-          </a:p>
-          <a:p>
-            <a:pPr algn="l"/>
+              <a:rPr lang="en-US" sz="2200" dirty="0" smtClean="0"/>
+              <a:t>Measurement</a:t>
+            </a:r>
+          </a:p>
+          <a:p>
+            <a:pPr marL="342900" indent="-342900" algn="l">
+              <a:buFont typeface="Arial"/>
+              <a:buChar char="•"/>
+            </a:pPr>
+            <a:r>
+              <a:rPr lang="en-US" sz="2200" dirty="0" smtClean="0"/>
+              <a:t>Defect rate – bugs per LOC or </a:t>
+            </a:r>
+            <a:r>
+              <a:rPr lang="en-US" sz="2200" dirty="0" err="1" smtClean="0"/>
+              <a:t>dev</a:t>
+            </a:r>
+            <a:r>
+              <a:rPr lang="en-US" sz="2200" dirty="0" smtClean="0"/>
+              <a:t> hour</a:t>
+            </a:r>
+          </a:p>
+          <a:p>
+            <a:pPr marL="342900" indent="-342900" algn="l">
+              <a:buFont typeface="Arial"/>
+              <a:buChar char="•"/>
+            </a:pPr>
+            <a:r>
+              <a:rPr lang="en-US" sz="2200" dirty="0" smtClean="0"/>
+              <a:t>Code coverage</a:t>
+            </a:r>
+          </a:p>
+          <a:p>
+            <a:pPr marL="342900" indent="-342900" algn="l">
+              <a:buFont typeface="Arial"/>
+              <a:buChar char="•"/>
+            </a:pPr>
+            <a:r>
+              <a:rPr lang="en-US" sz="2200" dirty="0" smtClean="0"/>
+              <a:t>Heat map – correlate VCS changes with bug reports</a:t>
+            </a:r>
+          </a:p>
+          <a:p>
+            <a:pPr marL="342900" indent="-342900" algn="l">
+              <a:buFont typeface="Arial"/>
+              <a:buChar char="•"/>
+            </a:pPr>
+            <a:r>
+              <a:rPr lang="en-US" sz="2200" dirty="0"/>
+              <a:t>attribute-component-capability matrix</a:t>
+            </a:r>
             <a:endParaRPr lang="en-US" sz="2200" dirty="0" smtClean="0"/>
           </a:p>
           <a:p>
-            <a:pPr algn="l"/>
-            <a:r>
-              <a:rPr lang="en-US" sz="2200" dirty="0" smtClean="0"/>
-              <a:t>Setup</a:t>
-            </a:r>
-            <a:endParaRPr lang="en-US" sz="2200" dirty="0"/>
-          </a:p>
-          <a:p>
-            <a:pPr algn="l"/>
-            <a:r>
-              <a:rPr lang="en-US" sz="2200" dirty="0"/>
-              <a:t> - Brief review/intro to </a:t>
-            </a:r>
-            <a:r>
-              <a:rPr lang="en-US" sz="2200" dirty="0" err="1"/>
-              <a:t>npm</a:t>
-            </a:r>
-            <a:r>
-              <a:rPr lang="en-US" sz="2200" dirty="0"/>
+            <a:pPr marL="342900" indent="-342900" algn="l">
+              <a:buFont typeface="Arial"/>
+              <a:buChar char="•"/>
+            </a:pPr>
+            <a:r>
+              <a:rPr lang="en-US" sz="2000" dirty="0"/>
+              <a:t>http://</a:t>
+            </a:r>
+            <a:r>
+              <a:rPr lang="en-US" sz="2000" dirty="0" err="1"/>
+              <a:t>www.kaner.com</a:t>
+            </a:r>
+            <a:r>
+              <a:rPr lang="en-US" sz="2000" dirty="0"/>
               <a:t>/</a:t>
             </a:r>
             <a:r>
-              <a:rPr lang="en-US" sz="2200" dirty="0" err="1"/>
-              <a:t>package.json</a:t>
-            </a:r>
-            <a:r>
-              <a:rPr lang="en-US" sz="2200" dirty="0"/>
-              <a:t>, if needed</a:t>
-            </a:r>
-          </a:p>
-          <a:p>
-            <a:pPr algn="l"/>
-            <a:r>
-              <a:rPr lang="en-US" sz="2200" dirty="0"/>
-              <a:t> - Install Karma, Jasmine, Grunt, </a:t>
-            </a:r>
-            <a:r>
-              <a:rPr lang="en-US" sz="2200" dirty="0" err="1"/>
-              <a:t>jshint</a:t>
-            </a:r>
-            <a:endParaRPr lang="en-US" sz="2200" dirty="0"/>
-          </a:p>
-          <a:p>
-            <a:pPr algn="l"/>
-            <a:r>
-              <a:rPr lang="en-US" sz="2200" dirty="0"/>
-              <a:t> - Set up Grunt to run </a:t>
-            </a:r>
-            <a:r>
-              <a:rPr lang="en-US" sz="2200" dirty="0" err="1"/>
-              <a:t>jshint</a:t>
-            </a:r>
-            <a:endParaRPr lang="en-US" sz="2200" dirty="0"/>
-          </a:p>
-          <a:p>
-            <a:pPr algn="l"/>
-            <a:r>
-              <a:rPr lang="en-US" sz="2200" dirty="0"/>
-              <a:t>Jasmine</a:t>
-            </a:r>
-          </a:p>
-          <a:p>
-            <a:pPr algn="l"/>
-            <a:r>
-              <a:rPr lang="en-US" sz="2200" dirty="0"/>
-              <a:t> - Structure and Syntax</a:t>
-            </a:r>
-          </a:p>
-          <a:p>
-            <a:pPr algn="l"/>
-            <a:r>
-              <a:rPr lang="en-US" sz="2200" dirty="0"/>
-              <a:t> - Suites &amp; Specs</a:t>
-            </a:r>
-          </a:p>
-          <a:p>
-            <a:pPr algn="l"/>
-            <a:r>
-              <a:rPr lang="en-US" sz="2200" dirty="0"/>
-              <a:t> - Matchers</a:t>
-            </a:r>
-          </a:p>
-          <a:p>
-            <a:pPr algn="l"/>
-            <a:r>
-              <a:rPr lang="en-US" sz="2200" dirty="0"/>
-              <a:t> - Hello World failing test</a:t>
-            </a:r>
-          </a:p>
-          <a:p>
-            <a:pPr algn="l"/>
-            <a:r>
-              <a:rPr lang="en-US" sz="2200" dirty="0"/>
-              <a:t> - Write Hello World code to make test </a:t>
-            </a:r>
-            <a:r>
-              <a:rPr lang="en-US" sz="2200" dirty="0" smtClean="0"/>
-              <a:t>pass</a:t>
-            </a:r>
-          </a:p>
-          <a:p>
-            <a:pPr algn="l"/>
-            <a:endParaRPr lang="en-US" sz="2200" dirty="0"/>
-          </a:p>
-          <a:p>
-            <a:pPr algn="l"/>
-            <a:r>
-              <a:rPr lang="en-US" sz="2200" dirty="0" smtClean="0"/>
-              <a:t>(15 min break)</a:t>
-            </a:r>
-            <a:endParaRPr lang="en-US" sz="2000" dirty="0"/>
+              <a:rPr lang="en-US" sz="2000" dirty="0" err="1"/>
+              <a:t>pdfs</a:t>
+            </a:r>
+            <a:r>
+              <a:rPr lang="en-US" sz="2000" dirty="0"/>
+              <a:t>/metrics2004.pdf</a:t>
+            </a:r>
           </a:p>
         </p:txBody>
       </p:sp>
     </p:spTree>
     <p:extLst>
       <p:ext uri="{BB962C8B-B14F-4D97-AF65-F5344CB8AC3E}">
-        <p14:creationId xmlns:p14="http://schemas.microsoft.com/office/powerpoint/2010/main" val="1489723374"/>
+        <p14:creationId xmlns:p14="http://schemas.microsoft.com/office/powerpoint/2010/main" val="1081058882"/>
       </p:ext>
     </p:extLst>
   </p:cSld>
@@ -5140,7 +5142,7 @@
           <a:p>
             <a:r>
               <a:rPr lang="en-US" dirty="0" smtClean="0"/>
-              <a:t>Schedule</a:t>
+              <a:t>Schedule – day 1</a:t>
             </a:r>
             <a:endParaRPr lang="en-US" dirty="0"/>
           </a:p>
@@ -5223,11 +5225,7 @@
             </a:pPr>
             <a:r>
               <a:rPr lang="en-US" sz="1800" dirty="0" smtClean="0"/>
-              <a:t>( </a:t>
-            </a:r>
-            <a:r>
-              <a:rPr lang="en-US" sz="1800" dirty="0" smtClean="0"/>
-              <a:t>break )</a:t>
+              <a:t>( break )</a:t>
             </a:r>
           </a:p>
           <a:p>
@@ -5247,32 +5245,18 @@
             </a:pPr>
             <a:r>
               <a:rPr lang="en-US" sz="1800" dirty="0" smtClean="0"/>
-              <a:t>( </a:t>
-            </a:r>
+              <a:t>( lunch )</a:t>
+            </a:r>
+          </a:p>
+          <a:p>
+            <a:pPr marL="342900" indent="-342900" algn="l">
+              <a:buFont typeface="Arial"/>
+              <a:buChar char="•"/>
+            </a:pPr>
             <a:r>
               <a:rPr lang="en-US" sz="1800" dirty="0" smtClean="0"/>
-              <a:t>lunch </a:t>
-            </a:r>
-            <a:r>
-              <a:rPr lang="en-US" sz="1800" dirty="0" smtClean="0"/>
-              <a:t>)</a:t>
-            </a:r>
-            <a:endParaRPr lang="en-US" sz="1800" dirty="0" smtClean="0"/>
-          </a:p>
-          <a:p>
-            <a:pPr marL="342900" indent="-342900" algn="l">
-              <a:buFont typeface="Arial"/>
-              <a:buChar char="•"/>
-            </a:pPr>
-            <a:r>
-              <a:rPr lang="en-US" sz="1800" dirty="0" smtClean="0"/>
-              <a:t>Lab: </a:t>
-            </a:r>
-            <a:r>
-              <a:rPr lang="en-US" sz="1800" dirty="0" smtClean="0"/>
-              <a:t>Add Backbone and Karma to the mix</a:t>
-            </a:r>
-            <a:endParaRPr lang="en-US" sz="1800" dirty="0" smtClean="0"/>
+              <a:t>Lab: Add Backbone and Karma to the mix</a:t>
+            </a:r>
           </a:p>
           <a:p>
             <a:pPr marL="342900" indent="-342900" algn="l">
@@ -5371,7 +5355,7 @@
           <a:p>
             <a:r>
               <a:rPr lang="en-US" dirty="0" smtClean="0"/>
-              <a:t>Lab: Plan &amp; TDD</a:t>
+              <a:t>Lab: Get started</a:t>
             </a:r>
             <a:endParaRPr lang="en-US" dirty="0"/>
           </a:p>
@@ -5395,9 +5379,129 @@
         </p:spPr>
         <p:txBody>
           <a:bodyPr>
-            <a:normAutofit/>
+            <a:normAutofit fontScale="92500" lnSpcReduction="20000"/>
           </a:bodyPr>
           <a:lstStyle/>
+          <a:p>
+            <a:pPr algn="l"/>
+            <a:r>
+              <a:rPr lang="en-US" sz="2400" dirty="0"/>
+              <a:t>(Code-along, 30 </a:t>
+            </a:r>
+            <a:r>
+              <a:rPr lang="en-US" sz="2400" dirty="0" err="1"/>
+              <a:t>mins</a:t>
+            </a:r>
+            <a:r>
+              <a:rPr lang="en-US" sz="2400" dirty="0" smtClean="0"/>
+              <a:t>)</a:t>
+            </a:r>
+          </a:p>
+          <a:p>
+            <a:pPr algn="l"/>
+            <a:endParaRPr lang="en-US" sz="2200" dirty="0" smtClean="0"/>
+          </a:p>
+          <a:p>
+            <a:pPr algn="l"/>
+            <a:r>
+              <a:rPr lang="en-US" sz="2200" dirty="0" smtClean="0"/>
+              <a:t>Setup</a:t>
+            </a:r>
+            <a:endParaRPr lang="en-US" sz="2200" dirty="0"/>
+          </a:p>
+          <a:p>
+            <a:pPr algn="l"/>
+            <a:r>
+              <a:rPr lang="en-US" sz="2200" dirty="0"/>
+              <a:t> - Brief review/intro to </a:t>
+            </a:r>
+            <a:r>
+              <a:rPr lang="en-US" sz="2200" dirty="0" err="1"/>
+              <a:t>npm</a:t>
+            </a:r>
+            <a:r>
+              <a:rPr lang="en-US" sz="2200" dirty="0"/>
+              <a:t>/</a:t>
+            </a:r>
+            <a:r>
+              <a:rPr lang="en-US" sz="2200" dirty="0" err="1"/>
+              <a:t>package.json</a:t>
+            </a:r>
+            <a:r>
+              <a:rPr lang="en-US" sz="2200" dirty="0"/>
+              <a:t>, if needed</a:t>
+            </a:r>
+          </a:p>
+          <a:p>
+            <a:pPr algn="l"/>
+            <a:r>
+              <a:rPr lang="en-US" sz="2200" dirty="0"/>
+              <a:t> - Install Karma, Jasmine, Grunt, </a:t>
+            </a:r>
+            <a:r>
+              <a:rPr lang="en-US" sz="2200" dirty="0" err="1"/>
+              <a:t>jshint</a:t>
+            </a:r>
+            <a:endParaRPr lang="en-US" sz="2200" dirty="0"/>
+          </a:p>
+          <a:p>
+            <a:pPr algn="l"/>
+            <a:r>
+              <a:rPr lang="en-US" sz="2200" dirty="0"/>
+              <a:t> - Set up Grunt to run </a:t>
+            </a:r>
+            <a:r>
+              <a:rPr lang="en-US" sz="2200" dirty="0" err="1"/>
+              <a:t>jshint</a:t>
+            </a:r>
+            <a:endParaRPr lang="en-US" sz="2200" dirty="0"/>
+          </a:p>
+          <a:p>
+            <a:pPr algn="l"/>
+            <a:r>
+              <a:rPr lang="en-US" sz="2200" dirty="0"/>
+              <a:t>Jasmine</a:t>
+            </a:r>
+          </a:p>
+          <a:p>
+            <a:pPr algn="l"/>
+            <a:r>
+              <a:rPr lang="en-US" sz="2200" dirty="0"/>
+              <a:t> - Structure and Syntax</a:t>
+            </a:r>
+          </a:p>
+          <a:p>
+            <a:pPr algn="l"/>
+            <a:r>
+              <a:rPr lang="en-US" sz="2200" dirty="0"/>
+              <a:t> - Suites &amp; Specs</a:t>
+            </a:r>
+          </a:p>
+          <a:p>
+            <a:pPr algn="l"/>
+            <a:r>
+              <a:rPr lang="en-US" sz="2200" dirty="0"/>
+              <a:t> - Matchers</a:t>
+            </a:r>
+          </a:p>
+          <a:p>
+            <a:pPr algn="l"/>
+            <a:r>
+              <a:rPr lang="en-US" sz="2200" dirty="0"/>
+              <a:t> - Hello World failing test</a:t>
+            </a:r>
+          </a:p>
+          <a:p>
+            <a:pPr algn="l"/>
+            <a:r>
+              <a:rPr lang="en-US" sz="2200" dirty="0"/>
+              <a:t> - Write Hello World code to make test </a:t>
+            </a:r>
+            <a:r>
+              <a:rPr lang="en-US" sz="2200" dirty="0" smtClean="0"/>
+              <a:t>pass</a:t>
+            </a:r>
+          </a:p>
           <a:p>
             <a:pPr algn="l"/>
             <a:endParaRPr lang="en-US" sz="2200" dirty="0"/>
@@ -5405,82 +5509,17 @@
           <a:p>
             <a:pPr algn="l"/>
             <a:r>
-              <a:rPr lang="en-US" sz="2200" dirty="0"/>
-              <a:t>(Discussion, 20 </a:t>
-            </a:r>
-            <a:r>
-              <a:rPr lang="en-US" sz="2200" dirty="0" err="1"/>
-              <a:t>mins</a:t>
-            </a:r>
-            <a:r>
-              <a:rPr lang="en-US" sz="2200" dirty="0"/>
-              <a:t>)</a:t>
-            </a:r>
-          </a:p>
-          <a:p>
-            <a:pPr algn="l"/>
-            <a:r>
-              <a:rPr lang="en-US" sz="2200" dirty="0"/>
-              <a:t> - Review the use cases/features for our demo code</a:t>
-            </a:r>
-          </a:p>
-          <a:p>
-            <a:pPr algn="l"/>
-            <a:r>
-              <a:rPr lang="en-US" sz="2200" dirty="0"/>
-              <a:t> - Outline a general plan for how to implement</a:t>
-            </a:r>
-          </a:p>
-          <a:p>
-            <a:pPr algn="l"/>
-            <a:endParaRPr lang="en-US" sz="2200" dirty="0"/>
-          </a:p>
-          <a:p>
-            <a:pPr algn="l"/>
-            <a:r>
-              <a:rPr lang="en-US" sz="2200" dirty="0"/>
-              <a:t>(Code-along, 60 </a:t>
-            </a:r>
-            <a:r>
-              <a:rPr lang="en-US" sz="2200" dirty="0" err="1"/>
-              <a:t>mins</a:t>
-            </a:r>
-            <a:r>
-              <a:rPr lang="en-US" sz="2200" dirty="0"/>
-              <a:t>)</a:t>
-            </a:r>
-          </a:p>
-          <a:p>
-            <a:pPr algn="l"/>
-            <a:r>
-              <a:rPr lang="en-US" sz="2200" dirty="0"/>
-              <a:t> - Do TDD! Write tests then write code</a:t>
-            </a:r>
-          </a:p>
-          <a:p>
-            <a:pPr algn="l"/>
-            <a:r>
-              <a:rPr lang="en-US" sz="2200" dirty="0"/>
-              <a:t> - Vanilla JS at this point</a:t>
-            </a:r>
-          </a:p>
-          <a:p>
-            <a:pPr algn="l"/>
-            <a:endParaRPr lang="en-US" sz="2200" dirty="0"/>
-          </a:p>
-          <a:p>
-            <a:pPr algn="l"/>
-            <a:r>
-              <a:rPr lang="en-US" sz="2200" dirty="0"/>
-              <a:t>(lunch)</a:t>
-            </a:r>
+              <a:rPr lang="en-US" sz="2200" dirty="0" smtClean="0"/>
+              <a:t>(15 min break)</a:t>
+            </a:r>
+            <a:endParaRPr lang="en-US" sz="2000" dirty="0"/>
           </a:p>
         </p:txBody>
       </p:sp>
     </p:spTree>
     <p:extLst>
       <p:ext uri="{BB962C8B-B14F-4D97-AF65-F5344CB8AC3E}">
-        <p14:creationId xmlns:p14="http://schemas.microsoft.com/office/powerpoint/2010/main" val="3926192779"/>
+        <p14:creationId xmlns:p14="http://schemas.microsoft.com/office/powerpoint/2010/main" val="1489723374"/>
       </p:ext>
     </p:extLst>
   </p:cSld>
@@ -5536,7 +5575,7 @@
           <a:p>
             <a:r>
               <a:rPr lang="en-US" dirty="0" smtClean="0"/>
-              <a:t>Lab: Add Backbone &amp; Karma</a:t>
+              <a:t>Lab: Plan &amp; TDD</a:t>
             </a:r>
             <a:endParaRPr lang="en-US" dirty="0"/>
           </a:p>
@@ -5565,6 +5604,43 @@
           <a:lstStyle/>
           <a:p>
             <a:pPr algn="l"/>
+            <a:endParaRPr lang="en-US" sz="2200" dirty="0"/>
+          </a:p>
+          <a:p>
+            <a:pPr algn="l"/>
+            <a:r>
+              <a:rPr lang="en-US" sz="2200" dirty="0"/>
+              <a:t>(Discussion, 20 </a:t>
+            </a:r>
+            <a:r>
+              <a:rPr lang="en-US" sz="2200" dirty="0" err="1"/>
+              <a:t>mins</a:t>
+            </a:r>
+            <a:r>
+              <a:rPr lang="en-US" sz="2200" dirty="0"/>
+              <a:t>)</a:t>
+            </a:r>
+          </a:p>
+          <a:p>
+            <a:pPr algn="l"/>
+            <a:r>
+              <a:rPr lang="en-US" sz="2200" dirty="0"/>
+              <a:t> - Review the use cases/features for our demo code</a:t>
+            </a:r>
+          </a:p>
+          <a:p>
+            <a:pPr algn="l"/>
+            <a:r>
+              <a:rPr lang="en-US" sz="2200" dirty="0"/>
+              <a:t> - Outline a general plan for how to implement</a:t>
+            </a:r>
+          </a:p>
+          <a:p>
+            <a:pPr algn="l"/>
+            <a:endParaRPr lang="en-US" sz="2200" dirty="0"/>
+          </a:p>
+          <a:p>
+            <a:pPr algn="l"/>
             <a:r>
               <a:rPr lang="en-US" sz="2200" dirty="0"/>
               <a:t>(Code-along, 60 </a:t>
@@ -5582,35 +5658,14 @@
             <a:pPr algn="l"/>
             <a:r>
               <a:rPr lang="en-US" sz="2200" dirty="0"/>
-              <a:t> - Set up Karma</a:t>
+              <a:t> - Do TDD! Write tests then write code</a:t>
             </a:r>
           </a:p>
           <a:p>
             <a:pPr algn="l"/>
             <a:r>
               <a:rPr lang="en-US" sz="2200" dirty="0"/>
-              <a:t> - Add Backbone</a:t>
-            </a:r>
-          </a:p>
-          <a:p>
-            <a:pPr algn="l"/>
-            <a:r>
-              <a:rPr lang="en-US" sz="2200" dirty="0"/>
-              <a:t> - Split spec into multiple files</a:t>
-            </a:r>
-          </a:p>
-          <a:p>
-            <a:pPr algn="l"/>
-            <a:r>
-              <a:rPr lang="en-US" sz="2200" dirty="0"/>
-              <a:t> - Set up Karma to test multiple browsers</a:t>
-            </a:r>
-          </a:p>
-          <a:p>
-            <a:pPr algn="l"/>
-            <a:r>
-              <a:rPr lang="en-US" sz="2200" dirty="0"/>
-              <a:t> - E2E versus units with Backbone</a:t>
+              <a:t> - Vanilla JS at this point</a:t>
             </a:r>
           </a:p>
           <a:p>
@@ -5620,12 +5675,8 @@
           <a:p>
             <a:pPr algn="l"/>
             <a:r>
-              <a:rPr lang="en-US" sz="2200" dirty="0" smtClean="0"/>
-              <a:t>(15 min break</a:t>
-            </a:r>
-            <a:r>
               <a:rPr lang="en-US" sz="2200" dirty="0"/>
-              <a:t>)</a:t>
+              <a:t>(lunch)</a:t>
             </a:r>
           </a:p>
         </p:txBody>
@@ -5633,7 +5684,7 @@
     </p:spTree>
     <p:extLst>
       <p:ext uri="{BB962C8B-B14F-4D97-AF65-F5344CB8AC3E}">
-        <p14:creationId xmlns:p14="http://schemas.microsoft.com/office/powerpoint/2010/main" val="1890478168"/>
+        <p14:creationId xmlns:p14="http://schemas.microsoft.com/office/powerpoint/2010/main" val="3926192779"/>
       </p:ext>
     </p:extLst>
   </p:cSld>
@@ -5689,6 +5740,159 @@
           <a:p>
             <a:r>
               <a:rPr lang="en-US" dirty="0" smtClean="0"/>
+              <a:t>Lab: Add Backbone &amp; Karma</a:t>
+            </a:r>
+            <a:endParaRPr lang="en-US" dirty="0"/>
+          </a:p>
+        </p:txBody>
+      </p:sp>
+      <p:sp>
+        <p:nvSpPr>
+          <p:cNvPr id="3" name="Subtitle 2"/>
+          <p:cNvSpPr>
+            <a:spLocks noGrp="1"/>
+          </p:cNvSpPr>
+          <p:nvPr>
+            <p:ph type="subTitle" idx="1"/>
+          </p:nvPr>
+        </p:nvSpPr>
+        <p:spPr>
+          <a:xfrm>
+            <a:off x="454651" y="1630710"/>
+            <a:ext cx="8371875" cy="4609893"/>
+          </a:xfrm>
+        </p:spPr>
+        <p:txBody>
+          <a:bodyPr>
+            <a:normAutofit/>
+          </a:bodyPr>
+          <a:lstStyle/>
+          <a:p>
+            <a:pPr algn="l"/>
+            <a:r>
+              <a:rPr lang="en-US" sz="2200" dirty="0"/>
+              <a:t>(Code-along, 60 </a:t>
+            </a:r>
+            <a:r>
+              <a:rPr lang="en-US" sz="2200" dirty="0" err="1"/>
+              <a:t>mins</a:t>
+            </a:r>
+            <a:r>
+              <a:rPr lang="en-US" sz="2200" dirty="0"/>
+              <a:t>)</a:t>
+            </a:r>
+          </a:p>
+          <a:p>
+            <a:pPr algn="l"/>
+            <a:r>
+              <a:rPr lang="en-US" sz="2200" dirty="0"/>
+              <a:t> - Set up Karma</a:t>
+            </a:r>
+          </a:p>
+          <a:p>
+            <a:pPr algn="l"/>
+            <a:r>
+              <a:rPr lang="en-US" sz="2200" dirty="0"/>
+              <a:t> - Add Backbone</a:t>
+            </a:r>
+          </a:p>
+          <a:p>
+            <a:pPr algn="l"/>
+            <a:r>
+              <a:rPr lang="en-US" sz="2200" dirty="0"/>
+              <a:t> - Split spec into multiple files</a:t>
+            </a:r>
+          </a:p>
+          <a:p>
+            <a:pPr algn="l"/>
+            <a:r>
+              <a:rPr lang="en-US" sz="2200" dirty="0"/>
+              <a:t> - Set up Karma to test multiple browsers</a:t>
+            </a:r>
+          </a:p>
+          <a:p>
+            <a:pPr algn="l"/>
+            <a:r>
+              <a:rPr lang="en-US" sz="2200" dirty="0"/>
+              <a:t> - E2E versus units with Backbone</a:t>
+            </a:r>
+          </a:p>
+          <a:p>
+            <a:pPr algn="l"/>
+            <a:endParaRPr lang="en-US" sz="2200" dirty="0"/>
+          </a:p>
+          <a:p>
+            <a:pPr algn="l"/>
+            <a:r>
+              <a:rPr lang="en-US" sz="2200" dirty="0" smtClean="0"/>
+              <a:t>(15 min break</a:t>
+            </a:r>
+            <a:r>
+              <a:rPr lang="en-US" sz="2200" dirty="0"/>
+              <a:t>)</a:t>
+            </a:r>
+          </a:p>
+        </p:txBody>
+      </p:sp>
+    </p:spTree>
+    <p:extLst>
+      <p:ext uri="{BB962C8B-B14F-4D97-AF65-F5344CB8AC3E}">
+        <p14:creationId xmlns:p14="http://schemas.microsoft.com/office/powerpoint/2010/main" val="1890478168"/>
+      </p:ext>
+    </p:extLst>
+  </p:cSld>
+  <p:clrMapOvr>
+    <a:masterClrMapping/>
+  </p:clrMapOvr>
+  <p:timing>
+    <p:tnLst>
+      <p:par>
+        <p:cTn xmlns:p14="http://schemas.microsoft.com/office/powerpoint/2010/main" id="1" dur="indefinite" restart="never" nodeType="tmRoot"/>
+      </p:par>
+    </p:tnLst>
+  </p:timing>
+</p:sld>
+</file>
+
+<file path=ppt/slides/slide23.xml><?xml version="1.0" encoding="utf-8"?>
+<p:sld xmlns:a="http://schemas.openxmlformats.org/drawingml/2006/main" xmlns:r="http://schemas.openxmlformats.org/officeDocument/2006/relationships" xmlns:p="http://schemas.openxmlformats.org/presentationml/2006/main">
+  <p:cSld>
+    <p:spTree>
+      <p:nvGrpSpPr>
+        <p:cNvPr id="1" name=""/>
+        <p:cNvGrpSpPr/>
+        <p:nvPr/>
+      </p:nvGrpSpPr>
+      <p:grpSpPr>
+        <a:xfrm>
+          <a:off x="0" y="0"/>
+          <a:ext cx="0" cy="0"/>
+          <a:chOff x="0" y="0"/>
+          <a:chExt cx="0" cy="0"/>
+        </a:xfrm>
+      </p:grpSpPr>
+      <p:sp>
+        <p:nvSpPr>
+          <p:cNvPr id="2" name="Title 1"/>
+          <p:cNvSpPr>
+            <a:spLocks noGrp="1"/>
+          </p:cNvSpPr>
+          <p:nvPr>
+            <p:ph type="ctrTitle"/>
+          </p:nvPr>
+        </p:nvSpPr>
+        <p:spPr>
+          <a:xfrm>
+            <a:off x="685800" y="160685"/>
+            <a:ext cx="7772400" cy="1470025"/>
+          </a:xfrm>
+        </p:spPr>
+        <p:txBody>
+          <a:bodyPr/>
+          <a:lstStyle/>
+          <a:p>
+            <a:r>
+              <a:rPr lang="en-US" dirty="0" smtClean="0"/>
               <a:t>Advanced Jasmine</a:t>
             </a:r>
             <a:endParaRPr lang="en-US" dirty="0"/>
@@ -5776,7 +5980,7 @@
 </p:sld>
 </file>
 
-<file path=ppt/slides/slide23.xml><?xml version="1.0" encoding="utf-8"?>
+<file path=ppt/slides/slide24.xml><?xml version="1.0" encoding="utf-8"?>
 <p:sld xmlns:a="http://schemas.openxmlformats.org/drawingml/2006/main" xmlns:r="http://schemas.openxmlformats.org/officeDocument/2006/relationships" xmlns:p="http://schemas.openxmlformats.org/presentationml/2006/main">
   <p:cSld>
     <p:spTree>
@@ -6021,8 +6225,16 @@
           <a:lstStyle/>
           <a:p>
             <a:r>
+              <a:rPr lang="en-US" dirty="0"/>
+              <a:t>Schedule </a:t>
+            </a:r>
+            <a:r>
               <a:rPr lang="en-US" dirty="0" smtClean="0"/>
-              <a:t>Get Started</a:t>
+              <a:t>– </a:t>
+            </a:r>
+            <a:r>
+              <a:rPr lang="en-US" dirty="0" smtClean="0"/>
+              <a:t>day 2</a:t>
             </a:r>
             <a:endParaRPr lang="en-US" dirty="0"/>
           </a:p>
@@ -6055,60 +6267,95 @@
               <a:buChar char="•"/>
             </a:pPr>
             <a:r>
-              <a:rPr lang="en-US" sz="2000" dirty="0" smtClean="0"/>
-              <a:t>Introductions &amp; icebreakers</a:t>
-            </a:r>
-          </a:p>
-          <a:p>
-            <a:pPr marL="342900" indent="-342900" algn="l">
-              <a:buFont typeface="Arial"/>
-              <a:buChar char="•"/>
-            </a:pPr>
-            <a:r>
-              <a:rPr lang="en-US" sz="2000" dirty="0"/>
-              <a:t>Course guidelines &amp; </a:t>
-            </a:r>
-            <a:r>
-              <a:rPr lang="en-US" sz="2000" dirty="0" smtClean="0"/>
-              <a:t>housekeeping</a:t>
-            </a:r>
-          </a:p>
-          <a:p>
-            <a:pPr marL="342900" indent="-342900" algn="l">
-              <a:buFont typeface="Arial"/>
-              <a:buChar char="•"/>
-            </a:pPr>
-            <a:r>
-              <a:rPr lang="en-US" sz="2000" dirty="0" smtClean="0"/>
-              <a:t>Session Objectives</a:t>
-            </a:r>
-          </a:p>
-          <a:p>
-            <a:pPr marL="800100" lvl="1" indent="-342900" algn="l">
-              <a:buFont typeface="Arial"/>
-              <a:buChar char="•"/>
-            </a:pPr>
-            <a:r>
-              <a:rPr lang="en-US" sz="1600" dirty="0" smtClean="0"/>
-              <a:t>Demonstrate understanding of best practices</a:t>
-            </a:r>
-          </a:p>
-          <a:p>
-            <a:pPr marL="800100" lvl="1" indent="-342900" algn="l">
-              <a:buFont typeface="Arial"/>
-              <a:buChar char="•"/>
-            </a:pPr>
-            <a:r>
-              <a:rPr lang="en-US" sz="1600" dirty="0" smtClean="0"/>
-              <a:t>Fluency writing tests &amp; automating them</a:t>
-            </a:r>
+              <a:rPr lang="en-US" sz="1800" dirty="0" smtClean="0"/>
+              <a:t>Review</a:t>
+            </a:r>
+          </a:p>
+          <a:p>
+            <a:pPr marL="342900" indent="-342900" algn="l">
+              <a:buFont typeface="Arial"/>
+              <a:buChar char="•"/>
+            </a:pPr>
+            <a:r>
+              <a:rPr lang="en-US" sz="1800" dirty="0" smtClean="0"/>
+              <a:t>Lab: Add Marionette to the stack</a:t>
+            </a:r>
+            <a:endParaRPr lang="en-US" sz="1800" dirty="0"/>
+          </a:p>
+          <a:p>
+            <a:pPr marL="342900" indent="-342900" algn="l">
+              <a:buFont typeface="Arial"/>
+              <a:buChar char="•"/>
+            </a:pPr>
+            <a:r>
+              <a:rPr lang="en-US" sz="1800" dirty="0" smtClean="0"/>
+              <a:t>( break )</a:t>
+            </a:r>
+          </a:p>
+          <a:p>
+            <a:pPr marL="342900" indent="-342900" algn="l">
+              <a:buFont typeface="Arial"/>
+              <a:buChar char="•"/>
+            </a:pPr>
+            <a:r>
+              <a:rPr lang="en-US" sz="1800" dirty="0" smtClean="0"/>
+              <a:t>Open period for review or student requests</a:t>
+            </a:r>
+            <a:endParaRPr lang="en-US" sz="1800" dirty="0"/>
+          </a:p>
+          <a:p>
+            <a:pPr marL="342900" indent="-342900" algn="l">
+              <a:buFont typeface="Arial"/>
+              <a:buChar char="•"/>
+            </a:pPr>
+            <a:r>
+              <a:rPr lang="en-US" sz="1800" dirty="0" smtClean="0"/>
+              <a:t>( lunch )</a:t>
+            </a:r>
+          </a:p>
+          <a:p>
+            <a:pPr marL="342900" indent="-342900" algn="l">
+              <a:buFont typeface="Arial"/>
+              <a:buChar char="•"/>
+            </a:pPr>
+            <a:r>
+              <a:rPr lang="en-US" sz="1800" dirty="0" smtClean="0"/>
+              <a:t>Lab: Practical examples</a:t>
+            </a:r>
+          </a:p>
+          <a:p>
+            <a:pPr marL="342900" indent="-342900" algn="l">
+              <a:buFont typeface="Arial"/>
+              <a:buChar char="•"/>
+            </a:pPr>
+            <a:r>
+              <a:rPr lang="en-US" sz="1800" dirty="0" smtClean="0"/>
+              <a:t>( break )</a:t>
+            </a:r>
+          </a:p>
+          <a:p>
+            <a:pPr marL="342900" indent="-342900" algn="l">
+              <a:buFont typeface="Arial"/>
+              <a:buChar char="•"/>
+            </a:pPr>
+            <a:r>
+              <a:rPr lang="en-US" sz="1800" dirty="0"/>
+              <a:t>Lab: Practical examples</a:t>
+            </a:r>
+          </a:p>
+          <a:p>
+            <a:pPr marL="342900" indent="-342900" algn="l">
+              <a:buFont typeface="Arial"/>
+              <a:buChar char="•"/>
+            </a:pPr>
+            <a:endParaRPr lang="en-US" sz="1800" dirty="0" smtClean="0"/>
           </a:p>
         </p:txBody>
       </p:sp>
     </p:spTree>
     <p:extLst>
       <p:ext uri="{BB962C8B-B14F-4D97-AF65-F5344CB8AC3E}">
-        <p14:creationId xmlns:p14="http://schemas.microsoft.com/office/powerpoint/2010/main" val="3095697846"/>
+        <p14:creationId xmlns:p14="http://schemas.microsoft.com/office/powerpoint/2010/main" val="3464019895"/>
       </p:ext>
     </p:extLst>
   </p:cSld>
@@ -6154,7 +6401,7 @@
         </p:nvSpPr>
         <p:spPr>
           <a:xfrm>
-            <a:off x="685800" y="2541935"/>
+            <a:off x="685800" y="160685"/>
             <a:ext cx="7772400" cy="1470025"/>
           </a:xfrm>
         </p:spPr>
@@ -6164,16 +6411,93 @@
           <a:p>
             <a:r>
               <a:rPr lang="en-US" dirty="0" smtClean="0"/>
-              <a:t>Why Test?</a:t>
+              <a:t>Get Started</a:t>
             </a:r>
             <a:endParaRPr lang="en-US" dirty="0"/>
+          </a:p>
+        </p:txBody>
+      </p:sp>
+      <p:sp>
+        <p:nvSpPr>
+          <p:cNvPr id="3" name="Subtitle 2"/>
+          <p:cNvSpPr>
+            <a:spLocks noGrp="1"/>
+          </p:cNvSpPr>
+          <p:nvPr>
+            <p:ph type="subTitle" idx="1"/>
+          </p:nvPr>
+        </p:nvSpPr>
+        <p:spPr>
+          <a:xfrm>
+            <a:off x="454651" y="1630710"/>
+            <a:ext cx="8371875" cy="4609893"/>
+          </a:xfrm>
+        </p:spPr>
+        <p:txBody>
+          <a:bodyPr>
+            <a:normAutofit/>
+          </a:bodyPr>
+          <a:lstStyle/>
+          <a:p>
+            <a:pPr marL="342900" indent="-342900" algn="l">
+              <a:buFont typeface="Arial"/>
+              <a:buChar char="•"/>
+            </a:pPr>
+            <a:r>
+              <a:rPr lang="en-US" sz="2000" dirty="0" smtClean="0"/>
+              <a:t>Introductions &amp; icebreakers</a:t>
+            </a:r>
+          </a:p>
+          <a:p>
+            <a:pPr marL="342900" indent="-342900" algn="l">
+              <a:buFont typeface="Arial"/>
+              <a:buChar char="•"/>
+            </a:pPr>
+            <a:r>
+              <a:rPr lang="en-US" sz="2000" dirty="0"/>
+              <a:t>Course guidelines &amp; </a:t>
+            </a:r>
+            <a:r>
+              <a:rPr lang="en-US" sz="2000" dirty="0" smtClean="0"/>
+              <a:t>housekeeping</a:t>
+            </a:r>
+          </a:p>
+          <a:p>
+            <a:pPr marL="342900" indent="-342900" algn="l">
+              <a:buFont typeface="Arial"/>
+              <a:buChar char="•"/>
+            </a:pPr>
+            <a:r>
+              <a:rPr lang="en-US" sz="2000" dirty="0" smtClean="0"/>
+              <a:t>Session Objectives</a:t>
+            </a:r>
+          </a:p>
+          <a:p>
+            <a:pPr marL="800100" lvl="1" indent="-342900" algn="l">
+              <a:buFont typeface="Arial"/>
+              <a:buChar char="•"/>
+            </a:pPr>
+            <a:r>
+              <a:rPr lang="en-US" sz="1600" dirty="0" smtClean="0"/>
+              <a:t>Demonstrate understanding of best practices</a:t>
+            </a:r>
+          </a:p>
+          <a:p>
+            <a:pPr marL="800100" lvl="1" indent="-342900" algn="l">
+              <a:buFont typeface="Arial"/>
+              <a:buChar char="•"/>
+            </a:pPr>
+            <a:r>
+              <a:rPr lang="en-US" sz="1600" dirty="0" smtClean="0"/>
+              <a:t>Fluency writing tests &amp; automating them</a:t>
+            </a:r>
           </a:p>
         </p:txBody>
       </p:sp>
     </p:spTree>
     <p:extLst>
       <p:ext uri="{BB962C8B-B14F-4D97-AF65-F5344CB8AC3E}">
-        <p14:creationId xmlns:p14="http://schemas.microsoft.com/office/powerpoint/2010/main" val="3693108046"/>
+        <p14:creationId xmlns:p14="http://schemas.microsoft.com/office/powerpoint/2010/main" val="3095697846"/>
       </p:ext>
     </p:extLst>
   </p:cSld>
@@ -6219,7 +6543,7 @@
         </p:nvSpPr>
         <p:spPr>
           <a:xfrm>
-            <a:off x="685800" y="160685"/>
+            <a:off x="685800" y="2541935"/>
             <a:ext cx="7772400" cy="1470025"/>
           </a:xfrm>
         </p:spPr>
@@ -6235,53 +6559,10 @@
           </a:p>
         </p:txBody>
       </p:sp>
-      <p:sp>
-        <p:nvSpPr>
-          <p:cNvPr id="3" name="Subtitle 2"/>
-          <p:cNvSpPr>
-            <a:spLocks noGrp="1"/>
-          </p:cNvSpPr>
-          <p:nvPr>
-            <p:ph type="subTitle" idx="1"/>
-          </p:nvPr>
-        </p:nvSpPr>
-        <p:spPr>
-          <a:xfrm>
-            <a:off x="454651" y="1630710"/>
-            <a:ext cx="8371875" cy="4609893"/>
-          </a:xfrm>
-        </p:spPr>
-        <p:txBody>
-          <a:bodyPr>
-            <a:normAutofit/>
-          </a:bodyPr>
-          <a:lstStyle/>
-          <a:p>
-            <a:endParaRPr lang="en-US" sz="2000" dirty="0"/>
-          </a:p>
-          <a:p>
-            <a:r>
-              <a:rPr lang="en-US" sz="2000" dirty="0"/>
-              <a:t>“Software testing alone has limited </a:t>
-            </a:r>
-            <a:r>
-              <a:rPr lang="en-US" sz="2000" dirty="0" smtClean="0"/>
-              <a:t>effectiveness [in catching bugs] </a:t>
-            </a:r>
-            <a:r>
-              <a:rPr lang="en-US" sz="2000" dirty="0"/>
-              <a:t>- the average defect detection rate is only 25 percent for unit testing, 35 percent for function testing, and 45 percent for integration testing. In contrast, the average effectiveness of design and code inspections are 55 and 60 percent.” - McConnell, Code Complete</a:t>
-            </a:r>
-          </a:p>
-          <a:p>
-            <a:endParaRPr lang="en-US" sz="2000" dirty="0" smtClean="0"/>
-          </a:p>
-        </p:txBody>
-      </p:sp>
     </p:spTree>
     <p:extLst>
       <p:ext uri="{BB962C8B-B14F-4D97-AF65-F5344CB8AC3E}">
-        <p14:creationId xmlns:p14="http://schemas.microsoft.com/office/powerpoint/2010/main" val="2677088427"/>
+        <p14:creationId xmlns:p14="http://schemas.microsoft.com/office/powerpoint/2010/main" val="3693108046"/>
       </p:ext>
     </p:extLst>
   </p:cSld>
@@ -6365,91 +6646,31 @@
           </a:bodyPr>
           <a:lstStyle/>
           <a:p>
-            <a:pPr marL="342900" indent="-342900" algn="l">
-              <a:buFont typeface="Arial"/>
-              <a:buChar char="•"/>
-            </a:pPr>
+            <a:endParaRPr lang="en-US" sz="2000" dirty="0"/>
+          </a:p>
+          <a:p>
+            <a:r>
+              <a:rPr lang="en-US" sz="2000" dirty="0"/>
+              <a:t>“Software testing alone has limited </a:t>
+            </a:r>
             <a:r>
               <a:rPr lang="en-US" sz="2000" dirty="0" smtClean="0"/>
-              <a:t>Catching bugs is one of many testing benefits</a:t>
-            </a:r>
-          </a:p>
-          <a:p>
-            <a:pPr marL="342900" indent="-342900" algn="l">
-              <a:buFont typeface="Arial"/>
-              <a:buChar char="•"/>
-            </a:pPr>
-            <a:r>
-              <a:rPr lang="en-US" sz="2000" dirty="0" smtClean="0"/>
-              <a:t>But tests will not catch all bugs</a:t>
-            </a:r>
-          </a:p>
-          <a:p>
-            <a:pPr marL="342900" indent="-342900" algn="l">
-              <a:buFont typeface="Arial"/>
-              <a:buChar char="•"/>
-            </a:pPr>
-            <a:r>
-              <a:rPr lang="en-US" sz="2000" dirty="0" smtClean="0"/>
-              <a:t>Verifying "correctness" is like proving a negative</a:t>
-            </a:r>
-          </a:p>
-          <a:p>
-            <a:pPr marL="342900" indent="-342900" algn="l">
-              <a:buFont typeface="Arial"/>
-              <a:buChar char="•"/>
-            </a:pPr>
-            <a:r>
-              <a:rPr lang="en-US" sz="2000" dirty="0" smtClean="0"/>
-              <a:t>How can you write tests for bugs you don't yet know about?</a:t>
-            </a:r>
-          </a:p>
-          <a:p>
-            <a:pPr marL="342900" indent="-342900" algn="l">
-              <a:buFont typeface="Arial"/>
-              <a:buChar char="•"/>
-            </a:pPr>
-            <a:r>
-              <a:rPr lang="en-US" sz="2000" dirty="0" smtClean="0"/>
-              <a:t>Testing promotes confidence in deployment and refactoring</a:t>
-            </a:r>
-          </a:p>
-          <a:p>
-            <a:pPr marL="342900" indent="-342900" algn="l">
-              <a:buFont typeface="Arial"/>
-              <a:buChar char="•"/>
-            </a:pPr>
-            <a:r>
-              <a:rPr lang="en-US" sz="2000" dirty="0" smtClean="0"/>
-              <a:t>Frequent refactoring and deployment promotes quality code</a:t>
-            </a:r>
-          </a:p>
-          <a:p>
-            <a:pPr marL="342900" indent="-342900" algn="l">
-              <a:buFont typeface="Arial"/>
-              <a:buChar char="•"/>
-            </a:pPr>
-            <a:r>
-              <a:rPr lang="en-US" sz="2000" dirty="0" smtClean="0"/>
-              <a:t>Hawthorne effect: thinking about testing results in better code</a:t>
-            </a:r>
-          </a:p>
-          <a:p>
-            <a:pPr marL="342900" indent="-342900" algn="l">
-              <a:buFont typeface="Arial"/>
-              <a:buChar char="•"/>
-            </a:pPr>
-            <a:r>
-              <a:rPr lang="en-US" sz="2000" dirty="0" smtClean="0"/>
-              <a:t>Alert you to non-obvious connections at development time</a:t>
-            </a:r>
+              <a:t>effectiveness [in catching bugs] </a:t>
+            </a:r>
+            <a:r>
+              <a:rPr lang="en-US" sz="2000" dirty="0"/>
+              <a:t>- the average defect detection rate is only 25 percent for unit testing, 35 percent for function testing, and 45 percent for integration testing. In contrast, the average effectiveness of design and code inspections are 55 and 60 percent.” - McConnell, Code Complete</a:t>
+            </a:r>
+          </a:p>
+          <a:p>
+            <a:endParaRPr lang="en-US" sz="2000" dirty="0" smtClean="0"/>
           </a:p>
         </p:txBody>
       </p:sp>
     </p:spTree>
     <p:extLst>
       <p:ext uri="{BB962C8B-B14F-4D97-AF65-F5344CB8AC3E}">
-        <p14:creationId xmlns:p14="http://schemas.microsoft.com/office/powerpoint/2010/main" val="463238647"/>
+        <p14:creationId xmlns:p14="http://schemas.microsoft.com/office/powerpoint/2010/main" val="2677088427"/>
       </p:ext>
     </p:extLst>
   </p:cSld>
@@ -6533,10 +6754,13 @@
           </a:bodyPr>
           <a:lstStyle/>
           <a:p>
-            <a:pPr algn="l"/>
+            <a:pPr marL="342900" indent="-342900" algn="l">
+              <a:buFont typeface="Arial"/>
+              <a:buChar char="•"/>
+            </a:pPr>
             <a:r>
               <a:rPr lang="en-US" sz="2000" dirty="0" smtClean="0"/>
-              <a:t>Software Quality Assurance includes…</a:t>
+              <a:t>Catching bugs is one of many testing benefits</a:t>
             </a:r>
           </a:p>
           <a:p>
@@ -6546,7 +6770,7 @@
             </a:pPr>
             <a:r>
               <a:rPr lang="en-US" sz="2000" dirty="0" smtClean="0"/>
-              <a:t>Style guide &amp; linter</a:t>
+              <a:t>But tests will not catch all bugs</a:t>
             </a:r>
           </a:p>
           <a:p>
@@ -6556,11 +6780,7 @@
             </a:pPr>
             <a:r>
               <a:rPr lang="en-US" sz="2000" dirty="0" smtClean="0"/>
-              <a:t>Version </a:t>
-            </a:r>
-            <a:r>
-              <a:rPr lang="en-US" sz="2000" dirty="0"/>
-              <a:t>control</a:t>
+              <a:t>Verifying "correctness" is like proving a negative</a:t>
             </a:r>
           </a:p>
           <a:p>
@@ -6570,7 +6790,7 @@
             </a:pPr>
             <a:r>
               <a:rPr lang="en-US" sz="2000" dirty="0" smtClean="0"/>
-              <a:t>Automated testing</a:t>
+              <a:t>How can you write tests for bugs you don't yet know about?</a:t>
             </a:r>
           </a:p>
           <a:p>
@@ -6580,7 +6800,7 @@
             </a:pPr>
             <a:r>
               <a:rPr lang="en-US" sz="2000" dirty="0" smtClean="0"/>
-              <a:t>Manual testing</a:t>
+              <a:t>Testing promotes confidence in deployment and refactoring</a:t>
             </a:r>
           </a:p>
           <a:p>
@@ -6590,7 +6810,7 @@
             </a:pPr>
             <a:r>
               <a:rPr lang="en-US" sz="2000" dirty="0" smtClean="0"/>
-              <a:t>Code reviews</a:t>
+              <a:t>Frequent refactoring and deployment promotes quality code</a:t>
             </a:r>
           </a:p>
           <a:p>
@@ -6600,7 +6820,7 @@
             </a:pPr>
             <a:r>
               <a:rPr lang="en-US" sz="2000" dirty="0" smtClean="0"/>
-              <a:t>Architecture</a:t>
+              <a:t>Hawthorne effect: thinking about testing results in better code</a:t>
             </a:r>
           </a:p>
           <a:p>
@@ -6610,27 +6830,7 @@
             </a:pPr>
             <a:r>
               <a:rPr lang="en-US" sz="2000" dirty="0" smtClean="0"/>
-              <a:t>Configuration management</a:t>
-            </a:r>
-          </a:p>
-          <a:p>
-            <a:pPr marL="342900" indent="-342900" algn="l">
-              <a:buFont typeface="Arial"/>
-              <a:buChar char="•"/>
-            </a:pPr>
-            <a:r>
-              <a:rPr lang="en-US" sz="2000" dirty="0" smtClean="0"/>
-              <a:t>Release management</a:t>
-            </a:r>
-          </a:p>
-          <a:p>
-            <a:pPr marL="342900" indent="-342900" algn="l">
-              <a:buFont typeface="Arial"/>
-              <a:buChar char="•"/>
-            </a:pPr>
-            <a:r>
-              <a:rPr lang="en-US" sz="2000" dirty="0" smtClean="0"/>
-              <a:t>Goals, plans &amp; metrics</a:t>
+              <a:t>Alert you to non-obvious connections at development time</a:t>
             </a:r>
           </a:p>
         </p:txBody>
@@ -6638,7 +6838,7 @@
     </p:spTree>
     <p:extLst>
       <p:ext uri="{BB962C8B-B14F-4D97-AF65-F5344CB8AC3E}">
-        <p14:creationId xmlns:p14="http://schemas.microsoft.com/office/powerpoint/2010/main" val="2277485757"/>
+        <p14:creationId xmlns:p14="http://schemas.microsoft.com/office/powerpoint/2010/main" val="463238647"/>
       </p:ext>
     </p:extLst>
   </p:cSld>
@@ -6694,15 +6894,7 @@
           <a:p>
             <a:r>
               <a:rPr lang="en-US" dirty="0" smtClean="0"/>
-              <a:t>Why </a:t>
-            </a:r>
-            <a:r>
-              <a:rPr lang="en-US" i="1" dirty="0" smtClean="0"/>
-              <a:t>not</a:t>
-            </a:r>
-            <a:r>
-              <a:rPr lang="en-US" dirty="0" smtClean="0"/>
-              <a:t> Test?</a:t>
+              <a:t>Why Test?</a:t>
             </a:r>
             <a:endParaRPr lang="en-US" dirty="0"/>
           </a:p>
@@ -6733,7 +6925,7 @@
             <a:pPr algn="l"/>
             <a:r>
               <a:rPr lang="en-US" sz="2000" dirty="0" smtClean="0"/>
-              <a:t>Common obstacles:</a:t>
+              <a:t>Software Quality Assurance includes…</a:t>
             </a:r>
           </a:p>
           <a:p>
@@ -6743,7 +6935,7 @@
             </a:pPr>
             <a:r>
               <a:rPr lang="en-US" sz="2000" dirty="0" smtClean="0"/>
-              <a:t>"Writing tests means less time for features."</a:t>
+              <a:t>Style guide &amp; linter</a:t>
             </a:r>
           </a:p>
           <a:p>
@@ -6753,7 +6945,11 @@
             </a:pPr>
             <a:r>
               <a:rPr lang="en-US" sz="2000" dirty="0" smtClean="0"/>
-              <a:t>"We already manually test and it works fine."</a:t>
+              <a:t>Version </a:t>
+            </a:r>
+            <a:r>
+              <a:rPr lang="en-US" sz="2000" dirty="0"/>
+              <a:t>control</a:t>
             </a:r>
           </a:p>
           <a:p>
@@ -6763,15 +6959,17 @@
             </a:pPr>
             <a:r>
               <a:rPr lang="en-US" sz="2000" dirty="0" smtClean="0"/>
-              <a:t>"Testing seems ideological and </a:t>
-            </a:r>
-            <a:r>
-              <a:rPr lang="en-US" sz="2000" dirty="0" err="1" smtClean="0"/>
-              <a:t>buzzwordy</a:t>
-            </a:r>
+              <a:t>Automated testing</a:t>
+            </a:r>
+          </a:p>
+          <a:p>
+            <a:pPr marL="342900" indent="-342900" algn="l">
+              <a:buFont typeface="Arial"/>
+              <a:buChar char="•"/>
+            </a:pPr>
             <a:r>
               <a:rPr lang="en-US" sz="2000" dirty="0" smtClean="0"/>
-              <a:t>."</a:t>
+              <a:t>Manual testing</a:t>
             </a:r>
           </a:p>
           <a:p>
@@ -6781,7 +6979,47 @@
             </a:pPr>
             <a:r>
               <a:rPr lang="en-US" sz="2000" dirty="0" smtClean="0"/>
-              <a:t>"Automated testing seems hard."</a:t>
+              <a:t>Code reviews</a:t>
+            </a:r>
+          </a:p>
+          <a:p>
+            <a:pPr marL="342900" indent="-342900" algn="l">
+              <a:buFont typeface="Arial"/>
+              <a:buChar char="•"/>
+            </a:pPr>
+            <a:r>
+              <a:rPr lang="en-US" sz="2000" dirty="0" smtClean="0"/>
+              <a:t>Architecture</a:t>
+            </a:r>
+          </a:p>
+          <a:p>
+            <a:pPr marL="342900" indent="-342900" algn="l">
+              <a:buFont typeface="Arial"/>
+              <a:buChar char="•"/>
+            </a:pPr>
+            <a:r>
+              <a:rPr lang="en-US" sz="2000" dirty="0" smtClean="0"/>
+              <a:t>Configuration management</a:t>
+            </a:r>
+          </a:p>
+          <a:p>
+            <a:pPr marL="342900" indent="-342900" algn="l">
+              <a:buFont typeface="Arial"/>
+              <a:buChar char="•"/>
+            </a:pPr>
+            <a:r>
+              <a:rPr lang="en-US" sz="2000" dirty="0" smtClean="0"/>
+              <a:t>Release management</a:t>
+            </a:r>
+          </a:p>
+          <a:p>
+            <a:pPr marL="342900" indent="-342900" algn="l">
+              <a:buFont typeface="Arial"/>
+              <a:buChar char="•"/>
+            </a:pPr>
+            <a:r>
+              <a:rPr lang="en-US" sz="2000" dirty="0" smtClean="0"/>
+              <a:t>Goals, plans &amp; metrics</a:t>
             </a:r>
           </a:p>
         </p:txBody>
@@ -6789,7 +7027,7 @@
     </p:spTree>
     <p:extLst>
       <p:ext uri="{BB962C8B-B14F-4D97-AF65-F5344CB8AC3E}">
-        <p14:creationId xmlns:p14="http://schemas.microsoft.com/office/powerpoint/2010/main" val="176992089"/>
+        <p14:creationId xmlns:p14="http://schemas.microsoft.com/office/powerpoint/2010/main" val="2277485757"/>
       </p:ext>
     </p:extLst>
   </p:cSld>
@@ -6845,7 +7083,15 @@
           <a:p>
             <a:r>
               <a:rPr lang="en-US" dirty="0" smtClean="0"/>
-              <a:t>Core Concepts: TDD &amp; BDD</a:t>
+              <a:t>Why </a:t>
+            </a:r>
+            <a:r>
+              <a:rPr lang="en-US" i="1" dirty="0" smtClean="0"/>
+              <a:t>not</a:t>
+            </a:r>
+            <a:r>
+              <a:rPr lang="en-US" dirty="0" smtClean="0"/>
+              <a:t> Test?</a:t>
             </a:r>
             <a:endParaRPr lang="en-US" dirty="0"/>
           </a:p>
@@ -6873,43 +7119,10 @@
           </a:bodyPr>
           <a:lstStyle/>
           <a:p>
-            <a:pPr marL="342900" indent="-342900" algn="l">
-              <a:buFont typeface="Arial"/>
-              <a:buChar char="•"/>
-            </a:pPr>
+            <a:pPr algn="l"/>
             <a:r>
               <a:rPr lang="en-US" sz="2000" dirty="0" smtClean="0"/>
-              <a:t>TDD</a:t>
-            </a:r>
-          </a:p>
-          <a:p>
-            <a:pPr marL="800100" lvl="1" indent="-342900" algn="l">
-              <a:buFont typeface="Arial"/>
-              <a:buChar char="•"/>
-            </a:pPr>
-            <a:r>
-              <a:rPr lang="en-US" sz="1600" dirty="0" smtClean="0"/>
-              <a:t>Test Driven Development means write a failing test first</a:t>
-            </a:r>
-          </a:p>
-          <a:p>
-            <a:pPr marL="800100" lvl="1" indent="-342900" algn="l">
-              <a:buFont typeface="Arial"/>
-              <a:buChar char="•"/>
-            </a:pPr>
-            <a:r>
-              <a:rPr lang="en-US" sz="1600" dirty="0" smtClean="0"/>
-              <a:t>Then write functionality to make test pass</a:t>
-            </a:r>
-          </a:p>
-          <a:p>
-            <a:pPr marL="800100" lvl="1" indent="-342900" algn="l">
-              <a:buFont typeface="Arial"/>
-              <a:buChar char="•"/>
-            </a:pPr>
-            <a:r>
-              <a:rPr lang="en-US" sz="1600" dirty="0" smtClean="0"/>
-              <a:t>Only what's needed to make test pass and no more</a:t>
+              <a:t>Common obstacles:</a:t>
             </a:r>
           </a:p>
           <a:p>
@@ -6919,27 +7132,7 @@
             </a:pPr>
             <a:r>
               <a:rPr lang="en-US" sz="2000" dirty="0" smtClean="0"/>
-              <a:t>BDD</a:t>
-            </a:r>
-          </a:p>
-          <a:p>
-            <a:pPr marL="800100" lvl="1" indent="-342900" algn="l">
-              <a:buFont typeface="Arial"/>
-              <a:buChar char="•"/>
-            </a:pPr>
-            <a:r>
-              <a:rPr lang="en-US" sz="1600" dirty="0" smtClean="0"/>
-              <a:t>Behavior Driven Development means write test objectives in plain English</a:t>
-            </a:r>
-          </a:p>
-          <a:p>
-            <a:pPr marL="800100" lvl="1" indent="-342900" algn="l">
-              <a:buFont typeface="Arial"/>
-              <a:buChar char="•"/>
-            </a:pPr>
-            <a:r>
-              <a:rPr lang="en-US" sz="1600" dirty="0" smtClean="0"/>
-              <a:t>Simultaneously define and implement the API that the code exposes</a:t>
+              <a:t>"Writing tests means less time for features."</a:t>
             </a:r>
           </a:p>
           <a:p>
@@ -6949,65 +7142,35 @@
             </a:pPr>
             <a:r>
               <a:rPr lang="en-US" sz="2000" dirty="0" smtClean="0"/>
-              <a:t>Benefits</a:t>
-            </a:r>
-          </a:p>
-          <a:p>
-            <a:pPr marL="800100" lvl="1" indent="-342900" algn="l">
-              <a:buFont typeface="Arial"/>
-              <a:buChar char="•"/>
-            </a:pPr>
-            <a:r>
-              <a:rPr lang="en-US" sz="1600" dirty="0" smtClean="0"/>
-              <a:t>TDD enables confident refactoring</a:t>
-            </a:r>
-          </a:p>
-          <a:p>
-            <a:pPr marL="800100" lvl="1" indent="-342900" algn="l">
-              <a:buFont typeface="Arial"/>
-              <a:buChar char="•"/>
-            </a:pPr>
-            <a:r>
-              <a:rPr lang="en-US" sz="1600" dirty="0" smtClean="0"/>
-              <a:t>TDD </a:t>
-            </a:r>
-            <a:r>
-              <a:rPr lang="en-US" sz="1600" dirty="0"/>
-              <a:t>prevents against premature </a:t>
-            </a:r>
-            <a:r>
-              <a:rPr lang="en-US" sz="1600" dirty="0" smtClean="0"/>
-              <a:t>optimization</a:t>
-            </a:r>
-          </a:p>
-          <a:p>
-            <a:pPr marL="800100" lvl="1" indent="-342900" algn="l">
-              <a:buFont typeface="Arial"/>
-              <a:buChar char="•"/>
-            </a:pPr>
-            <a:r>
-              <a:rPr lang="en-US" sz="1600" dirty="0" smtClean="0"/>
-              <a:t>TDD results in better code coverage</a:t>
-            </a:r>
-          </a:p>
-          <a:p>
-            <a:pPr marL="800100" lvl="1" indent="-342900" algn="l">
-              <a:buFont typeface="Arial"/>
-              <a:buChar char="•"/>
-            </a:pPr>
-            <a:r>
-              <a:rPr lang="en-US" sz="1600" dirty="0" smtClean="0"/>
-              <a:t>BDD promotes clear communication with stakeholders</a:t>
-            </a:r>
-          </a:p>
-          <a:p>
-            <a:pPr marL="800100" lvl="1" indent="-342900" algn="l">
-              <a:buFont typeface="Arial"/>
-              <a:buChar char="•"/>
-            </a:pPr>
-            <a:r>
-              <a:rPr lang="en-US" sz="1600" dirty="0" smtClean="0"/>
-              <a:t>BDD serves as living documentation</a:t>
+              <a:t>"We already manually test and it works fine."</a:t>
+            </a:r>
+          </a:p>
+          <a:p>
+            <a:pPr marL="342900" indent="-342900" algn="l">
+              <a:buFont typeface="Arial"/>
+              <a:buChar char="•"/>
+            </a:pPr>
+            <a:r>
+              <a:rPr lang="en-US" sz="2000" dirty="0" smtClean="0"/>
+              <a:t>"Testing seems ideological and </a:t>
+            </a:r>
+            <a:r>
+              <a:rPr lang="en-US" sz="2000" dirty="0" err="1" smtClean="0"/>
+              <a:t>buzzwordy</a:t>
+            </a:r>
+            <a:r>
+              <a:rPr lang="en-US" sz="2000" dirty="0" smtClean="0"/>
+              <a:t>."</a:t>
+            </a:r>
+          </a:p>
+          <a:p>
+            <a:pPr marL="342900" indent="-342900" algn="l">
+              <a:buFont typeface="Arial"/>
+              <a:buChar char="•"/>
+            </a:pPr>
+            <a:r>
+              <a:rPr lang="en-US" sz="2000" dirty="0" smtClean="0"/>
+              <a:t>"Automated testing seems hard."</a:t>
             </a:r>
           </a:p>
         </p:txBody>
@@ -7015,7 +7178,7 @@
     </p:spTree>
     <p:extLst>
       <p:ext uri="{BB962C8B-B14F-4D97-AF65-F5344CB8AC3E}">
-        <p14:creationId xmlns:p14="http://schemas.microsoft.com/office/powerpoint/2010/main" val="3354719638"/>
+        <p14:creationId xmlns:p14="http://schemas.microsoft.com/office/powerpoint/2010/main" val="176992089"/>
       </p:ext>
     </p:extLst>
   </p:cSld>

</xml_diff>